<commit_message>
update preg visit section
</commit_message>
<xml_diff>
--- a/illustrations.pptx
+++ b/illustrations.pptx
@@ -3457,8 +3457,8 @@
         </p:nvSpPr>
         <p:spPr>
           <a:xfrm>
-            <a:off x="-416859" y="6571129"/>
-            <a:ext cx="9179859" cy="4768026"/>
+            <a:off x="-107344" y="6571128"/>
+            <a:ext cx="5764697" cy="5522806"/>
           </a:xfrm>
           <a:prstGeom prst="rect">
             <a:avLst/>
@@ -3505,7 +3505,7 @@
         <p:spPr bwMode="auto">
           <a:xfrm flipV="1">
             <a:off x="241175" y="108208"/>
-            <a:ext cx="4999898" cy="11088710"/>
+            <a:ext cx="4999898" cy="11619966"/>
           </a:xfrm>
           <a:prstGeom prst="foldedCorner">
             <a:avLst>
@@ -3691,7 +3691,7 @@
         <p:spPr bwMode="auto">
           <a:xfrm>
             <a:off x="442115" y="868268"/>
-            <a:ext cx="4580553" cy="8373707"/>
+            <a:ext cx="4580553" cy="8848226"/>
           </a:xfrm>
           <a:prstGeom prst="rect">
             <a:avLst/>
@@ -4097,7 +4097,7 @@
         </p:nvSpPr>
         <p:spPr bwMode="auto">
           <a:xfrm>
-            <a:off x="442116" y="10213369"/>
+            <a:off x="442116" y="10750085"/>
             <a:ext cx="4580551" cy="338554"/>
           </a:xfrm>
           <a:prstGeom prst="rect">
@@ -4292,7 +4292,7 @@
         </p:nvSpPr>
         <p:spPr bwMode="auto">
           <a:xfrm>
-            <a:off x="442115" y="10646195"/>
+            <a:off x="442115" y="11182911"/>
             <a:ext cx="4580551" cy="338554"/>
           </a:xfrm>
           <a:prstGeom prst="rect">
@@ -4355,7 +4355,7 @@
         </p:nvSpPr>
         <p:spPr bwMode="auto">
           <a:xfrm>
-            <a:off x="442117" y="9337302"/>
+            <a:off x="442117" y="9874018"/>
             <a:ext cx="4580551" cy="338554"/>
           </a:xfrm>
           <a:prstGeom prst="rect">
@@ -4418,7 +4418,7 @@
         </p:nvSpPr>
         <p:spPr bwMode="auto">
           <a:xfrm>
-            <a:off x="442117" y="9780544"/>
+            <a:off x="442117" y="10317260"/>
             <a:ext cx="4580551" cy="338554"/>
           </a:xfrm>
           <a:prstGeom prst="rect">
@@ -5418,8 +5418,8 @@
         </p:nvSpPr>
         <p:spPr bwMode="auto">
           <a:xfrm>
-            <a:off x="613408" y="8316927"/>
-            <a:ext cx="4184753" cy="828000"/>
+            <a:off x="613408" y="8316926"/>
+            <a:ext cx="4184753" cy="1229777"/>
           </a:xfrm>
           <a:prstGeom prst="rect">
             <a:avLst/>
@@ -5540,6 +5540,81 @@
                 </a:solidFill>
               </a:rPr>
               <a:t>Encounter</a:t>
+            </a:r>
+            <a:r>
+              <a:rPr lang="fr-FR" sz="1600" noProof="1">
+                <a:solidFill>
+                  <a:schemeClr val="tx1"/>
+                </a:solidFill>
+              </a:rPr>
+              <a:t> (Reference)</a:t>
+            </a:r>
+          </a:p>
+        </p:txBody>
+      </p:sp>
+      <p:sp>
+        <p:nvSpPr>
+          <p:cNvPr id="2" name="Text Box 10">
+            <a:extLst>
+              <a:ext uri="{FF2B5EF4-FFF2-40B4-BE49-F238E27FC236}">
+                <a16:creationId xmlns:a16="http://schemas.microsoft.com/office/drawing/2014/main" id="{96B5F982-179C-DCCA-5B44-E094FA5A0CC4}"/>
+              </a:ext>
+            </a:extLst>
+          </p:cNvPr>
+          <p:cNvSpPr txBox="1">
+            <a:spLocks noChangeArrowheads="1"/>
+          </p:cNvSpPr>
+          <p:nvPr/>
+        </p:nvSpPr>
+        <p:spPr bwMode="auto">
+          <a:xfrm>
+            <a:off x="757646" y="9069921"/>
+            <a:ext cx="3845730" cy="338554"/>
+          </a:xfrm>
+          <a:prstGeom prst="rect">
+            <a:avLst/>
+          </a:prstGeom>
+          <a:ln>
+            <a:headEnd/>
+            <a:tailEnd/>
+          </a:ln>
+        </p:spPr>
+        <p:style>
+          <a:lnRef idx="0">
+            <a:schemeClr val="accent3"/>
+          </a:lnRef>
+          <a:fillRef idx="3">
+            <a:schemeClr val="accent3"/>
+          </a:fillRef>
+          <a:effectRef idx="3">
+            <a:schemeClr val="accent3"/>
+          </a:effectRef>
+          <a:fontRef idx="minor">
+            <a:schemeClr val="lt1"/>
+          </a:fontRef>
+        </p:style>
+        <p:txBody>
+          <a:bodyPr wrap="square">
+            <a:spAutoFit/>
+          </a:bodyPr>
+          <a:lstStyle/>
+          <a:p>
+            <a:pPr>
+              <a:spcBef>
+                <a:spcPts val="300"/>
+              </a:spcBef>
+              <a:spcAft>
+                <a:spcPts val="300"/>
+              </a:spcAft>
+              <a:defRPr/>
+            </a:pPr>
+            <a:r>
+              <a:rPr lang="fr-FR" sz="1600" b="1" noProof="1">
+                <a:solidFill>
+                  <a:schemeClr val="tx1"/>
+                </a:solidFill>
+              </a:rPr>
+              <a:t>Observation</a:t>
             </a:r>
             <a:r>
               <a:rPr lang="fr-FR" sz="1600" noProof="1">

</xml_diff>

<commit_message>
add mother fetus relationship
</commit_message>
<xml_diff>
--- a/illustrations.pptx
+++ b/illustrations.pptx
@@ -5,10 +5,11 @@
     <p:sldMasterId id="2147483648" r:id="rId1"/>
   </p:sldMasterIdLst>
   <p:notesMasterIdLst>
-    <p:notesMasterId r:id="rId3"/>
+    <p:notesMasterId r:id="rId4"/>
   </p:notesMasterIdLst>
   <p:sldIdLst>
     <p:sldId id="267" r:id="rId2"/>
+    <p:sldId id="1433" r:id="rId3"/>
   </p:sldIdLst>
   <p:sldSz cx="9144000" cy="6858000" type="screen4x3"/>
   <p:notesSz cx="6858000" cy="9144000"/>
@@ -208,7 +209,7 @@
           <a:p>
             <a:fld id="{AA0936E0-B937-435B-957D-29657CD375E8}" type="datetimeFigureOut">
               <a:rPr lang="de-CH" smtClean="0"/>
-              <a:t>25.03.2025</a:t>
+              <a:t>09.04.2025</a:t>
             </a:fld>
             <a:endParaRPr lang="de-CH"/>
           </a:p>
@@ -476,6 +477,90 @@
 </p:notesMaster>
 </file>
 
+<file path=ppt/notesSlides/notesSlide1.xml><?xml version="1.0" encoding="utf-8"?>
+<p:notes xmlns:a="http://schemas.openxmlformats.org/drawingml/2006/main" xmlns:r="http://schemas.openxmlformats.org/officeDocument/2006/relationships" xmlns:p="http://schemas.openxmlformats.org/presentationml/2006/main">
+  <p:cSld>
+    <p:spTree>
+      <p:nvGrpSpPr>
+        <p:cNvPr id="1" name=""/>
+        <p:cNvGrpSpPr/>
+        <p:nvPr/>
+      </p:nvGrpSpPr>
+      <p:grpSpPr>
+        <a:xfrm>
+          <a:off x="0" y="0"/>
+          <a:ext cx="0" cy="0"/>
+          <a:chOff x="0" y="0"/>
+          <a:chExt cx="0" cy="0"/>
+        </a:xfrm>
+      </p:grpSpPr>
+      <p:sp>
+        <p:nvSpPr>
+          <p:cNvPr id="2" name="Slide Image Placeholder 1"/>
+          <p:cNvSpPr>
+            <a:spLocks noGrp="1" noRot="1" noChangeAspect="1"/>
+          </p:cNvSpPr>
+          <p:nvPr>
+            <p:ph type="sldImg"/>
+          </p:nvPr>
+        </p:nvSpPr>
+        <p:spPr/>
+      </p:sp>
+      <p:sp>
+        <p:nvSpPr>
+          <p:cNvPr id="3" name="Notes Placeholder 2"/>
+          <p:cNvSpPr>
+            <a:spLocks noGrp="1"/>
+          </p:cNvSpPr>
+          <p:nvPr>
+            <p:ph type="body" idx="1"/>
+          </p:nvPr>
+        </p:nvSpPr>
+        <p:spPr/>
+        <p:txBody>
+          <a:bodyPr/>
+          <a:lstStyle/>
+          <a:p>
+            <a:endParaRPr lang="en-CH" dirty="0"/>
+          </a:p>
+        </p:txBody>
+      </p:sp>
+      <p:sp>
+        <p:nvSpPr>
+          <p:cNvPr id="4" name="Slide Number Placeholder 3"/>
+          <p:cNvSpPr>
+            <a:spLocks noGrp="1"/>
+          </p:cNvSpPr>
+          <p:nvPr>
+            <p:ph type="sldNum" sz="quarter" idx="5"/>
+          </p:nvPr>
+        </p:nvSpPr>
+        <p:spPr/>
+        <p:txBody>
+          <a:bodyPr/>
+          <a:lstStyle/>
+          <a:p>
+            <a:fld id="{A69C946F-C9B2-9B49-8DCA-D38D97C43A2F}" type="slidenum">
+              <a:rPr lang="en-US" smtClean="0"/>
+              <a:t>2</a:t>
+            </a:fld>
+            <a:endParaRPr lang="en-US"/>
+          </a:p>
+        </p:txBody>
+      </p:sp>
+    </p:spTree>
+    <p:extLst>
+      <p:ext uri="{BB962C8B-B14F-4D97-AF65-F5344CB8AC3E}">
+        <p14:creationId xmlns:p14="http://schemas.microsoft.com/office/powerpoint/2010/main" val="1734318823"/>
+      </p:ext>
+    </p:extLst>
+  </p:cSld>
+  <p:clrMapOvr>
+    <a:masterClrMapping/>
+  </p:clrMapOvr>
+</p:notes>
+</file>
+
 <file path=ppt/slideLayouts/slideLayout1.xml><?xml version="1.0" encoding="utf-8"?>
 <p:sldLayout xmlns:a="http://schemas.openxmlformats.org/drawingml/2006/main" xmlns:r="http://schemas.openxmlformats.org/officeDocument/2006/relationships" xmlns:p="http://schemas.openxmlformats.org/presentationml/2006/main" type="title" preserve="1">
   <p:cSld name="Titelfolie">
@@ -655,7 +740,7 @@
           <a:p>
             <a:fld id="{DAD4AEBD-E175-AE42-B084-2E4026DB8423}" type="datetimeFigureOut">
               <a:rPr lang="de-DE" smtClean="0"/>
-              <a:t>25.03.2025</a:t>
+              <a:t>09.04.2025</a:t>
             </a:fld>
             <a:endParaRPr lang="de-DE"/>
           </a:p>
@@ -823,7 +908,7 @@
           <a:p>
             <a:fld id="{DAD4AEBD-E175-AE42-B084-2E4026DB8423}" type="datetimeFigureOut">
               <a:rPr lang="de-DE" smtClean="0"/>
-              <a:t>25.03.2025</a:t>
+              <a:t>09.04.2025</a:t>
             </a:fld>
             <a:endParaRPr lang="de-DE"/>
           </a:p>
@@ -1001,7 +1086,7 @@
           <a:p>
             <a:fld id="{DAD4AEBD-E175-AE42-B084-2E4026DB8423}" type="datetimeFigureOut">
               <a:rPr lang="de-DE" smtClean="0"/>
-              <a:t>25.03.2025</a:t>
+              <a:t>09.04.2025</a:t>
             </a:fld>
             <a:endParaRPr lang="de-DE"/>
           </a:p>
@@ -1053,6 +1138,293 @@
     <p:extLst>
       <p:ext uri="{BB962C8B-B14F-4D97-AF65-F5344CB8AC3E}">
         <p14:creationId xmlns:p14="http://schemas.microsoft.com/office/powerpoint/2010/main" val="1957948006"/>
+      </p:ext>
+    </p:extLst>
+  </p:cSld>
+  <p:clrMapOvr>
+    <a:masterClrMapping/>
+  </p:clrMapOvr>
+</p:sldLayout>
+</file>
+
+<file path=ppt/slideLayouts/slideLayout12.xml><?xml version="1.0" encoding="utf-8"?>
+<p:sldLayout xmlns:a="http://schemas.openxmlformats.org/drawingml/2006/main" xmlns:r="http://schemas.openxmlformats.org/officeDocument/2006/relationships" xmlns:p="http://schemas.openxmlformats.org/presentationml/2006/main" userDrawn="1">
+  <p:cSld name="2_Benutzerdefiniertes Layout">
+    <p:spTree>
+      <p:nvGrpSpPr>
+        <p:cNvPr id="1" name=""/>
+        <p:cNvGrpSpPr/>
+        <p:nvPr/>
+      </p:nvGrpSpPr>
+      <p:grpSpPr>
+        <a:xfrm>
+          <a:off x="0" y="0"/>
+          <a:ext cx="0" cy="0"/>
+          <a:chOff x="0" y="0"/>
+          <a:chExt cx="0" cy="0"/>
+        </a:xfrm>
+      </p:grpSpPr>
+      <p:sp>
+        <p:nvSpPr>
+          <p:cNvPr id="7" name="Titel 1"/>
+          <p:cNvSpPr>
+            <a:spLocks noGrp="1"/>
+          </p:cNvSpPr>
+          <p:nvPr>
+            <p:ph type="title" hasCustomPrompt="1"/>
+          </p:nvPr>
+        </p:nvSpPr>
+        <p:spPr>
+          <a:xfrm>
+            <a:off x="575074" y="1836000"/>
+            <a:ext cx="2483999" cy="412430"/>
+          </a:xfrm>
+        </p:spPr>
+        <p:txBody>
+          <a:bodyPr lIns="0" tIns="0" rIns="0" bIns="0" anchor="t" anchorCtr="0">
+            <a:normAutofit/>
+          </a:bodyPr>
+          <a:lstStyle>
+            <a:lvl1pPr>
+              <a:defRPr sz="1798" b="0" i="0" baseline="0">
+                <a:solidFill>
+                  <a:schemeClr val="tx2"/>
+                </a:solidFill>
+              </a:defRPr>
+            </a:lvl1pPr>
+          </a:lstStyle>
+          <a:p>
+            <a:r>
+              <a:rPr lang="de-CH" dirty="0"/>
+              <a:t>Titel</a:t>
+            </a:r>
+            <a:endParaRPr lang="de-DE" dirty="0"/>
+          </a:p>
+        </p:txBody>
+      </p:sp>
+      <p:sp>
+        <p:nvSpPr>
+          <p:cNvPr id="8" name="Inhaltsplatzhalter 2"/>
+          <p:cNvSpPr>
+            <a:spLocks noGrp="1"/>
+          </p:cNvSpPr>
+          <p:nvPr>
+            <p:ph idx="1"/>
+          </p:nvPr>
+        </p:nvSpPr>
+        <p:spPr>
+          <a:xfrm>
+            <a:off x="3344095" y="1836000"/>
+            <a:ext cx="5412952" cy="4339950"/>
+          </a:xfrm>
+        </p:spPr>
+        <p:txBody>
+          <a:bodyPr lIns="0" tIns="0" rIns="0" bIns="0">
+            <a:normAutofit/>
+          </a:bodyPr>
+          <a:lstStyle>
+            <a:lvl1pPr>
+              <a:defRPr sz="2097" baseline="0"/>
+            </a:lvl1pPr>
+            <a:lvl2pPr>
+              <a:defRPr sz="2097" baseline="0"/>
+            </a:lvl2pPr>
+            <a:lvl3pPr>
+              <a:defRPr sz="2097" baseline="0"/>
+            </a:lvl3pPr>
+            <a:lvl4pPr>
+              <a:defRPr sz="2097" baseline="0"/>
+            </a:lvl4pPr>
+            <a:lvl5pPr>
+              <a:defRPr sz="2097" baseline="0"/>
+            </a:lvl5pPr>
+            <a:lvl6pPr>
+              <a:defRPr sz="1498"/>
+            </a:lvl6pPr>
+            <a:lvl7pPr>
+              <a:defRPr sz="1498"/>
+            </a:lvl7pPr>
+            <a:lvl8pPr>
+              <a:defRPr sz="1498"/>
+            </a:lvl8pPr>
+            <a:lvl9pPr>
+              <a:defRPr sz="1498"/>
+            </a:lvl9pPr>
+          </a:lstStyle>
+          <a:p>
+            <a:pPr lvl="0"/>
+            <a:r>
+              <a:rPr lang="de-CH" dirty="0"/>
+              <a:t>Mastertextformat bearbeiten</a:t>
+            </a:r>
+          </a:p>
+          <a:p>
+            <a:pPr lvl="1"/>
+            <a:r>
+              <a:rPr lang="de-CH" dirty="0"/>
+              <a:t>Zweite Ebene</a:t>
+            </a:r>
+          </a:p>
+          <a:p>
+            <a:pPr lvl="2"/>
+            <a:r>
+              <a:rPr lang="de-CH" dirty="0"/>
+              <a:t>Dritte Ebene</a:t>
+            </a:r>
+          </a:p>
+          <a:p>
+            <a:pPr lvl="3"/>
+            <a:r>
+              <a:rPr lang="de-CH" dirty="0"/>
+              <a:t>Vierte Ebene</a:t>
+            </a:r>
+          </a:p>
+          <a:p>
+            <a:pPr lvl="4"/>
+            <a:r>
+              <a:rPr lang="de-CH" dirty="0"/>
+              <a:t>Fünfte Ebene</a:t>
+            </a:r>
+            <a:endParaRPr lang="de-DE" dirty="0"/>
+          </a:p>
+        </p:txBody>
+      </p:sp>
+      <p:sp>
+        <p:nvSpPr>
+          <p:cNvPr id="9" name="Textplatzhalter 3"/>
+          <p:cNvSpPr>
+            <a:spLocks noGrp="1"/>
+          </p:cNvSpPr>
+          <p:nvPr>
+            <p:ph type="body" sz="half" idx="2"/>
+          </p:nvPr>
+        </p:nvSpPr>
+        <p:spPr>
+          <a:xfrm>
+            <a:off x="575072" y="2248430"/>
+            <a:ext cx="2483999" cy="3844394"/>
+          </a:xfrm>
+        </p:spPr>
+        <p:txBody>
+          <a:bodyPr lIns="0" tIns="0" rIns="0" bIns="0" anchor="t" anchorCtr="0">
+            <a:normAutofit/>
+          </a:bodyPr>
+          <a:lstStyle>
+            <a:lvl1pPr marL="0" indent="0">
+              <a:buNone/>
+              <a:defRPr sz="1049" baseline="0"/>
+            </a:lvl1pPr>
+            <a:lvl2pPr marL="342443" indent="0">
+              <a:buNone/>
+              <a:defRPr sz="1049"/>
+            </a:lvl2pPr>
+            <a:lvl3pPr marL="684886" indent="0">
+              <a:buNone/>
+              <a:defRPr sz="899"/>
+            </a:lvl3pPr>
+            <a:lvl4pPr marL="1027328" indent="0">
+              <a:buNone/>
+              <a:defRPr sz="749"/>
+            </a:lvl4pPr>
+            <a:lvl5pPr marL="1369771" indent="0">
+              <a:buNone/>
+              <a:defRPr sz="749"/>
+            </a:lvl5pPr>
+            <a:lvl6pPr marL="1712214" indent="0">
+              <a:buNone/>
+              <a:defRPr sz="749"/>
+            </a:lvl6pPr>
+            <a:lvl7pPr marL="2054657" indent="0">
+              <a:buNone/>
+              <a:defRPr sz="749"/>
+            </a:lvl7pPr>
+            <a:lvl8pPr marL="2397100" indent="0">
+              <a:buNone/>
+              <a:defRPr sz="749"/>
+            </a:lvl8pPr>
+            <a:lvl9pPr marL="2739542" indent="0">
+              <a:buNone/>
+              <a:defRPr sz="749"/>
+            </a:lvl9pPr>
+          </a:lstStyle>
+          <a:p>
+            <a:pPr lvl="0"/>
+            <a:r>
+              <a:rPr lang="de-CH" dirty="0"/>
+              <a:t>Mastertextformat bearbeiten</a:t>
+            </a:r>
+          </a:p>
+        </p:txBody>
+      </p:sp>
+      <p:sp>
+        <p:nvSpPr>
+          <p:cNvPr id="11" name="Textplatzhalter 6"/>
+          <p:cNvSpPr>
+            <a:spLocks noGrp="1"/>
+          </p:cNvSpPr>
+          <p:nvPr>
+            <p:ph type="body" sz="quarter" idx="11" hasCustomPrompt="1"/>
+          </p:nvPr>
+        </p:nvSpPr>
+        <p:spPr>
+          <a:xfrm>
+            <a:off x="575072" y="404815"/>
+            <a:ext cx="8187346" cy="331457"/>
+          </a:xfrm>
+        </p:spPr>
+        <p:txBody>
+          <a:bodyPr lIns="0" tIns="0" rIns="0" bIns="0"/>
+          <a:lstStyle>
+            <a:lvl1pPr marL="0" indent="0">
+              <a:buNone/>
+              <a:defRPr sz="899" baseline="0">
+                <a:solidFill>
+                  <a:schemeClr val="tx1"/>
+                </a:solidFill>
+              </a:defRPr>
+            </a:lvl1pPr>
+          </a:lstStyle>
+          <a:p>
+            <a:pPr lvl="0"/>
+            <a:r>
+              <a:rPr lang="de-CH" dirty="0" err="1"/>
+              <a:t>kapitelname</a:t>
+            </a:r>
+            <a:endParaRPr lang="de-DE" dirty="0"/>
+          </a:p>
+        </p:txBody>
+      </p:sp>
+      <p:sp>
+        <p:nvSpPr>
+          <p:cNvPr id="12" name="Fußzeilenplatzhalter 11"/>
+          <p:cNvSpPr>
+            <a:spLocks noGrp="1"/>
+          </p:cNvSpPr>
+          <p:nvPr>
+            <p:ph type="ftr" sz="quarter" idx="12"/>
+          </p:nvPr>
+        </p:nvSpPr>
+        <p:spPr/>
+        <p:txBody>
+          <a:bodyPr/>
+          <a:lstStyle/>
+          <a:p>
+            <a:r>
+              <a:rPr lang="de-DE"/>
+              <a:t>Ahdis gmbh, zürich, switzerland, </a:t>
+            </a:r>
+            <a:r>
+              <a:rPr lang="de-CH"/>
+              <a:t>27/11/2015</a:t>
+            </a:r>
+            <a:endParaRPr lang="de-DE" dirty="0"/>
+          </a:p>
+        </p:txBody>
+      </p:sp>
+    </p:spTree>
+    <p:extLst>
+      <p:ext uri="{BB962C8B-B14F-4D97-AF65-F5344CB8AC3E}">
+        <p14:creationId xmlns:p14="http://schemas.microsoft.com/office/powerpoint/2010/main" val="1444093031"/>
       </p:ext>
     </p:extLst>
   </p:cSld>
@@ -1169,7 +1541,7 @@
           <a:p>
             <a:fld id="{DAD4AEBD-E175-AE42-B084-2E4026DB8423}" type="datetimeFigureOut">
               <a:rPr lang="de-DE" smtClean="0"/>
-              <a:t>25.03.2025</a:t>
+              <a:t>09.04.2025</a:t>
             </a:fld>
             <a:endParaRPr lang="de-DE"/>
           </a:p>
@@ -1414,7 +1786,7 @@
           <a:p>
             <a:fld id="{DAD4AEBD-E175-AE42-B084-2E4026DB8423}" type="datetimeFigureOut">
               <a:rPr lang="de-DE" smtClean="0"/>
-              <a:t>25.03.2025</a:t>
+              <a:t>09.04.2025</a:t>
             </a:fld>
             <a:endParaRPr lang="de-DE"/>
           </a:p>
@@ -1699,7 +2071,7 @@
           <a:p>
             <a:fld id="{DAD4AEBD-E175-AE42-B084-2E4026DB8423}" type="datetimeFigureOut">
               <a:rPr lang="de-DE" smtClean="0"/>
-              <a:t>25.03.2025</a:t>
+              <a:t>09.04.2025</a:t>
             </a:fld>
             <a:endParaRPr lang="de-DE"/>
           </a:p>
@@ -2118,7 +2490,7 @@
           <a:p>
             <a:fld id="{DAD4AEBD-E175-AE42-B084-2E4026DB8423}" type="datetimeFigureOut">
               <a:rPr lang="de-DE" smtClean="0"/>
-              <a:t>25.03.2025</a:t>
+              <a:t>09.04.2025</a:t>
             </a:fld>
             <a:endParaRPr lang="de-DE"/>
           </a:p>
@@ -2235,7 +2607,7 @@
           <a:p>
             <a:fld id="{DAD4AEBD-E175-AE42-B084-2E4026DB8423}" type="datetimeFigureOut">
               <a:rPr lang="de-DE" smtClean="0"/>
-              <a:t>25.03.2025</a:t>
+              <a:t>09.04.2025</a:t>
             </a:fld>
             <a:endParaRPr lang="de-DE"/>
           </a:p>
@@ -2330,7 +2702,7 @@
           <a:p>
             <a:fld id="{DAD4AEBD-E175-AE42-B084-2E4026DB8423}" type="datetimeFigureOut">
               <a:rPr lang="de-DE" smtClean="0"/>
-              <a:t>25.03.2025</a:t>
+              <a:t>09.04.2025</a:t>
             </a:fld>
             <a:endParaRPr lang="de-DE"/>
           </a:p>
@@ -2605,7 +2977,7 @@
           <a:p>
             <a:fld id="{DAD4AEBD-E175-AE42-B084-2E4026DB8423}" type="datetimeFigureOut">
               <a:rPr lang="de-DE" smtClean="0"/>
-              <a:t>25.03.2025</a:t>
+              <a:t>09.04.2025</a:t>
             </a:fld>
             <a:endParaRPr lang="de-DE"/>
           </a:p>
@@ -2857,7 +3229,7 @@
           <a:p>
             <a:fld id="{DAD4AEBD-E175-AE42-B084-2E4026DB8423}" type="datetimeFigureOut">
               <a:rPr lang="de-DE" smtClean="0"/>
-              <a:t>25.03.2025</a:t>
+              <a:t>09.04.2025</a:t>
             </a:fld>
             <a:endParaRPr lang="de-DE"/>
           </a:p>
@@ -3068,7 +3440,7 @@
           <a:p>
             <a:fld id="{DAD4AEBD-E175-AE42-B084-2E4026DB8423}" type="datetimeFigureOut">
               <a:rPr lang="de-DE" smtClean="0"/>
-              <a:t>25.03.2025</a:t>
+              <a:t>09.04.2025</a:t>
             </a:fld>
             <a:endParaRPr lang="de-DE"/>
           </a:p>
@@ -3172,6 +3544,7 @@
     <p:sldLayoutId id="2147483657" r:id="rId9"/>
     <p:sldLayoutId id="2147483658" r:id="rId10"/>
     <p:sldLayoutId id="2147483659" r:id="rId11"/>
+    <p:sldLayoutId id="2147483660" r:id="rId12"/>
   </p:sldLayoutIdLst>
   <p:txStyles>
     <p:titleStyle>
@@ -5631,6 +6004,1546 @@
     <p:extLst>
       <p:ext uri="{BB962C8B-B14F-4D97-AF65-F5344CB8AC3E}">
         <p14:creationId xmlns:p14="http://schemas.microsoft.com/office/powerpoint/2010/main" val="3308390080"/>
+      </p:ext>
+    </p:extLst>
+  </p:cSld>
+  <p:clrMapOvr>
+    <a:masterClrMapping/>
+  </p:clrMapOvr>
+</p:sld>
+</file>
+
+<file path=ppt/slides/slide2.xml><?xml version="1.0" encoding="utf-8"?>
+<p:sld xmlns:a="http://schemas.openxmlformats.org/drawingml/2006/main" xmlns:r="http://schemas.openxmlformats.org/officeDocument/2006/relationships" xmlns:p="http://schemas.openxmlformats.org/presentationml/2006/main">
+  <p:cSld>
+    <p:spTree>
+      <p:nvGrpSpPr>
+        <p:cNvPr id="1" name=""/>
+        <p:cNvGrpSpPr/>
+        <p:nvPr/>
+      </p:nvGrpSpPr>
+      <p:grpSpPr>
+        <a:xfrm>
+          <a:off x="0" y="0"/>
+          <a:ext cx="0" cy="0"/>
+          <a:chOff x="0" y="0"/>
+          <a:chExt cx="0" cy="0"/>
+        </a:xfrm>
+      </p:grpSpPr>
+      <p:sp>
+        <p:nvSpPr>
+          <p:cNvPr id="12" name="Rectangle 11">
+            <a:extLst>
+              <a:ext uri="{FF2B5EF4-FFF2-40B4-BE49-F238E27FC236}">
+                <a16:creationId xmlns:a16="http://schemas.microsoft.com/office/drawing/2014/main" id="{8BFC5EF0-760D-3BB6-3AD2-5F335ED01D90}"/>
+              </a:ext>
+            </a:extLst>
+          </p:cNvPr>
+          <p:cNvSpPr/>
+          <p:nvPr/>
+        </p:nvSpPr>
+        <p:spPr>
+          <a:xfrm>
+            <a:off x="181855" y="665168"/>
+            <a:ext cx="2232000" cy="647157"/>
+          </a:xfrm>
+          <a:prstGeom prst="rect">
+            <a:avLst/>
+          </a:prstGeom>
+          <a:noFill/>
+          <a:ln w="19050" cap="flat" cmpd="sng" algn="ctr">
+            <a:solidFill>
+              <a:srgbClr val="C00000"/>
+            </a:solidFill>
+            <a:prstDash val="solid"/>
+            <a:miter lim="800000"/>
+          </a:ln>
+          <a:effectLst/>
+        </p:spPr>
+        <p:txBody>
+          <a:bodyPr rtlCol="0" anchor="ctr"/>
+          <a:lstStyle/>
+          <a:p>
+            <a:pPr algn="ctr" defTabSz="684886">
+              <a:defRPr/>
+            </a:pPr>
+            <a:r>
+              <a:rPr lang="en-US" sz="1198" kern="0" dirty="0">
+                <a:solidFill>
+                  <a:prstClr val="black"/>
+                </a:solidFill>
+                <a:latin typeface="Verdana" panose="020B0604030504040204" pitchFamily="34" charset="0"/>
+                <a:ea typeface="Verdana" panose="020B0604030504040204" pitchFamily="34" charset="0"/>
+              </a:rPr>
+              <a:t>CH EPREG Patient:</a:t>
+            </a:r>
+            <a:br>
+              <a:rPr lang="en-US" sz="1198" kern="0" dirty="0">
+                <a:solidFill>
+                  <a:prstClr val="black"/>
+                </a:solidFill>
+                <a:latin typeface="Verdana" panose="020B0604030504040204" pitchFamily="34" charset="0"/>
+                <a:ea typeface="Verdana" panose="020B0604030504040204" pitchFamily="34" charset="0"/>
+              </a:rPr>
+            </a:br>
+            <a:r>
+              <a:rPr lang="en-US" sz="1198" kern="0" dirty="0">
+                <a:solidFill>
+                  <a:prstClr val="black"/>
+                </a:solidFill>
+                <a:latin typeface="Verdana" panose="020B0604030504040204" pitchFamily="34" charset="0"/>
+                <a:ea typeface="Verdana" panose="020B0604030504040204" pitchFamily="34" charset="0"/>
+              </a:rPr>
+              <a:t>Mother</a:t>
+            </a:r>
+            <a:endParaRPr lang="en-US" sz="1348" kern="0" dirty="0">
+              <a:solidFill>
+                <a:prstClr val="black"/>
+              </a:solidFill>
+              <a:latin typeface="Verdana" panose="020B0604030504040204" pitchFamily="34" charset="0"/>
+              <a:ea typeface="Verdana" panose="020B0604030504040204" pitchFamily="34" charset="0"/>
+            </a:endParaRPr>
+          </a:p>
+        </p:txBody>
+      </p:sp>
+      <p:sp>
+        <p:nvSpPr>
+          <p:cNvPr id="13" name="Rectangle 12">
+            <a:extLst>
+              <a:ext uri="{FF2B5EF4-FFF2-40B4-BE49-F238E27FC236}">
+                <a16:creationId xmlns:a16="http://schemas.microsoft.com/office/drawing/2014/main" id="{4877C817-6CAB-C577-F4D6-4C0B5E94D545}"/>
+              </a:ext>
+            </a:extLst>
+          </p:cNvPr>
+          <p:cNvSpPr/>
+          <p:nvPr/>
+        </p:nvSpPr>
+        <p:spPr>
+          <a:xfrm>
+            <a:off x="3456000" y="665168"/>
+            <a:ext cx="2232000" cy="647157"/>
+          </a:xfrm>
+          <a:prstGeom prst="rect">
+            <a:avLst/>
+          </a:prstGeom>
+          <a:noFill/>
+          <a:ln w="19050" cap="flat" cmpd="sng" algn="ctr">
+            <a:solidFill>
+              <a:srgbClr val="A72931"/>
+            </a:solidFill>
+            <a:prstDash val="solid"/>
+            <a:miter lim="800000"/>
+          </a:ln>
+          <a:effectLst/>
+        </p:spPr>
+        <p:txBody>
+          <a:bodyPr rtlCol="0" anchor="ctr"/>
+          <a:lstStyle/>
+          <a:p>
+            <a:pPr algn="ctr" defTabSz="684886">
+              <a:defRPr/>
+            </a:pPr>
+            <a:r>
+              <a:rPr lang="en-US" sz="1198" kern="0" dirty="0">
+                <a:solidFill>
+                  <a:prstClr val="black"/>
+                </a:solidFill>
+                <a:latin typeface="Verdana" panose="020B0604030504040204" pitchFamily="34" charset="0"/>
+                <a:ea typeface="Verdana" panose="020B0604030504040204" pitchFamily="34" charset="0"/>
+              </a:rPr>
+              <a:t>CH EPREG RelatedPerson:</a:t>
+            </a:r>
+            <a:br>
+              <a:rPr lang="en-US" sz="1198" kern="0" dirty="0">
+                <a:solidFill>
+                  <a:prstClr val="black"/>
+                </a:solidFill>
+                <a:latin typeface="Verdana" panose="020B0604030504040204" pitchFamily="34" charset="0"/>
+                <a:ea typeface="Verdana" panose="020B0604030504040204" pitchFamily="34" charset="0"/>
+              </a:rPr>
+            </a:br>
+            <a:r>
+              <a:rPr lang="en-US" sz="1198" kern="0" dirty="0">
+                <a:solidFill>
+                  <a:prstClr val="black"/>
+                </a:solidFill>
+                <a:latin typeface="Verdana" panose="020B0604030504040204" pitchFamily="34" charset="0"/>
+                <a:ea typeface="Verdana" panose="020B0604030504040204" pitchFamily="34" charset="0"/>
+              </a:rPr>
+              <a:t>Mother of Fetus</a:t>
+            </a:r>
+            <a:endParaRPr lang="en-US" sz="899" kern="0" dirty="0">
+              <a:solidFill>
+                <a:prstClr val="black"/>
+              </a:solidFill>
+              <a:latin typeface="Verdana" panose="020B0604030504040204" pitchFamily="34" charset="0"/>
+              <a:ea typeface="Verdana" panose="020B0604030504040204" pitchFamily="34" charset="0"/>
+            </a:endParaRPr>
+          </a:p>
+        </p:txBody>
+      </p:sp>
+      <p:sp>
+        <p:nvSpPr>
+          <p:cNvPr id="18" name="Rectangle 17">
+            <a:extLst>
+              <a:ext uri="{FF2B5EF4-FFF2-40B4-BE49-F238E27FC236}">
+                <a16:creationId xmlns:a16="http://schemas.microsoft.com/office/drawing/2014/main" id="{1EE72964-DAD5-31BB-1AD9-BF5D9DA0A343}"/>
+              </a:ext>
+            </a:extLst>
+          </p:cNvPr>
+          <p:cNvSpPr/>
+          <p:nvPr/>
+        </p:nvSpPr>
+        <p:spPr>
+          <a:xfrm>
+            <a:off x="2468655" y="662834"/>
+            <a:ext cx="932544" cy="323579"/>
+          </a:xfrm>
+          <a:prstGeom prst="rect">
+            <a:avLst/>
+          </a:prstGeom>
+          <a:noFill/>
+          <a:ln w="12700" cap="flat" cmpd="sng" algn="ctr">
+            <a:noFill/>
+            <a:prstDash val="solid"/>
+            <a:miter lim="800000"/>
+          </a:ln>
+          <a:effectLst/>
+        </p:spPr>
+        <p:txBody>
+          <a:bodyPr rtlCol="0" anchor="ctr"/>
+          <a:lstStyle/>
+          <a:p>
+            <a:pPr algn="ctr" defTabSz="684886">
+              <a:defRPr/>
+            </a:pPr>
+            <a:r>
+              <a:rPr lang="en-US" sz="1198" kern="0" dirty="0">
+                <a:solidFill>
+                  <a:schemeClr val="bg1">
+                    <a:lumMod val="50000"/>
+                  </a:schemeClr>
+                </a:solidFill>
+                <a:latin typeface="Verdana" panose="020B0604030504040204" pitchFamily="34" charset="0"/>
+                <a:ea typeface="Verdana" panose="020B0604030504040204" pitchFamily="34" charset="0"/>
+              </a:rPr>
+              <a:t>link.other</a:t>
+            </a:r>
+          </a:p>
+        </p:txBody>
+      </p:sp>
+      <p:cxnSp>
+        <p:nvCxnSpPr>
+          <p:cNvPr id="33" name="Straight Arrow Connector 32">
+            <a:extLst>
+              <a:ext uri="{FF2B5EF4-FFF2-40B4-BE49-F238E27FC236}">
+                <a16:creationId xmlns:a16="http://schemas.microsoft.com/office/drawing/2014/main" id="{7A55CFCB-ED26-CA2D-F7D5-7B66D0130FA3}"/>
+              </a:ext>
+            </a:extLst>
+          </p:cNvPr>
+          <p:cNvCxnSpPr>
+            <a:cxnSpLocks/>
+            <a:stCxn id="12" idx="3"/>
+            <a:endCxn id="13" idx="1"/>
+          </p:cNvCxnSpPr>
+          <p:nvPr/>
+        </p:nvCxnSpPr>
+        <p:spPr>
+          <a:xfrm>
+            <a:off x="2413855" y="988747"/>
+            <a:ext cx="1042145" cy="0"/>
+          </a:xfrm>
+          <a:prstGeom prst="straightConnector1">
+            <a:avLst/>
+          </a:prstGeom>
+          <a:ln w="19050">
+            <a:solidFill>
+              <a:srgbClr val="B6B6B6"/>
+            </a:solidFill>
+            <a:tailEnd type="triangle"/>
+          </a:ln>
+        </p:spPr>
+        <p:style>
+          <a:lnRef idx="1">
+            <a:schemeClr val="accent1"/>
+          </a:lnRef>
+          <a:fillRef idx="0">
+            <a:schemeClr val="accent1"/>
+          </a:fillRef>
+          <a:effectRef idx="0">
+            <a:schemeClr val="accent1"/>
+          </a:effectRef>
+          <a:fontRef idx="minor">
+            <a:schemeClr val="tx1"/>
+          </a:fontRef>
+        </p:style>
+      </p:cxnSp>
+      <p:sp>
+        <p:nvSpPr>
+          <p:cNvPr id="8" name="Rectangle 7">
+            <a:extLst>
+              <a:ext uri="{FF2B5EF4-FFF2-40B4-BE49-F238E27FC236}">
+                <a16:creationId xmlns:a16="http://schemas.microsoft.com/office/drawing/2014/main" id="{FCE02F12-9C2E-D3FB-883A-2FD42A745C2B}"/>
+              </a:ext>
+            </a:extLst>
+          </p:cNvPr>
+          <p:cNvSpPr/>
+          <p:nvPr/>
+        </p:nvSpPr>
+        <p:spPr>
+          <a:xfrm>
+            <a:off x="6730145" y="665168"/>
+            <a:ext cx="2232000" cy="647157"/>
+          </a:xfrm>
+          <a:prstGeom prst="rect">
+            <a:avLst/>
+          </a:prstGeom>
+          <a:noFill/>
+          <a:ln w="19050" cap="flat" cmpd="sng" algn="ctr">
+            <a:solidFill>
+              <a:srgbClr val="F79646"/>
+            </a:solidFill>
+            <a:prstDash val="solid"/>
+            <a:miter lim="800000"/>
+          </a:ln>
+          <a:effectLst/>
+        </p:spPr>
+        <p:txBody>
+          <a:bodyPr rtlCol="0" anchor="ctr"/>
+          <a:lstStyle/>
+          <a:p>
+            <a:pPr algn="ctr" defTabSz="684886">
+              <a:defRPr/>
+            </a:pPr>
+            <a:r>
+              <a:rPr lang="en-US" sz="1198" kern="0" dirty="0">
+                <a:solidFill>
+                  <a:prstClr val="black"/>
+                </a:solidFill>
+                <a:latin typeface="Verdana" panose="020B0604030504040204" pitchFamily="34" charset="0"/>
+                <a:ea typeface="Verdana" panose="020B0604030504040204" pitchFamily="34" charset="0"/>
+              </a:rPr>
+              <a:t>CH EPREG Patient:</a:t>
+            </a:r>
+            <a:br>
+              <a:rPr lang="en-US" sz="1198" kern="0" dirty="0">
+                <a:solidFill>
+                  <a:prstClr val="black"/>
+                </a:solidFill>
+                <a:latin typeface="Verdana" panose="020B0604030504040204" pitchFamily="34" charset="0"/>
+                <a:ea typeface="Verdana" panose="020B0604030504040204" pitchFamily="34" charset="0"/>
+              </a:rPr>
+            </a:br>
+            <a:r>
+              <a:rPr lang="en-US" sz="1198" kern="0" dirty="0">
+                <a:solidFill>
+                  <a:prstClr val="black"/>
+                </a:solidFill>
+                <a:latin typeface="Verdana" panose="020B0604030504040204" pitchFamily="34" charset="0"/>
+                <a:ea typeface="Verdana" panose="020B0604030504040204" pitchFamily="34" charset="0"/>
+              </a:rPr>
+              <a:t>Fetus</a:t>
+            </a:r>
+            <a:endParaRPr lang="en-US" sz="899" kern="0" dirty="0">
+              <a:solidFill>
+                <a:prstClr val="black"/>
+              </a:solidFill>
+              <a:latin typeface="Verdana" panose="020B0604030504040204" pitchFamily="34" charset="0"/>
+              <a:ea typeface="Verdana" panose="020B0604030504040204" pitchFamily="34" charset="0"/>
+            </a:endParaRPr>
+          </a:p>
+        </p:txBody>
+      </p:sp>
+      <p:cxnSp>
+        <p:nvCxnSpPr>
+          <p:cNvPr id="14" name="Straight Arrow Connector 13">
+            <a:extLst>
+              <a:ext uri="{FF2B5EF4-FFF2-40B4-BE49-F238E27FC236}">
+                <a16:creationId xmlns:a16="http://schemas.microsoft.com/office/drawing/2014/main" id="{EC845EE2-005F-1E0B-4AAF-CBA32365BC84}"/>
+              </a:ext>
+            </a:extLst>
+          </p:cNvPr>
+          <p:cNvCxnSpPr>
+            <a:cxnSpLocks/>
+            <a:stCxn id="13" idx="3"/>
+            <a:endCxn id="8" idx="1"/>
+          </p:cNvCxnSpPr>
+          <p:nvPr/>
+        </p:nvCxnSpPr>
+        <p:spPr>
+          <a:xfrm>
+            <a:off x="5688000" y="988747"/>
+            <a:ext cx="1042145" cy="0"/>
+          </a:xfrm>
+          <a:prstGeom prst="straightConnector1">
+            <a:avLst/>
+          </a:prstGeom>
+          <a:ln w="19050">
+            <a:solidFill>
+              <a:srgbClr val="B6B6B6"/>
+            </a:solidFill>
+            <a:tailEnd type="triangle"/>
+          </a:ln>
+        </p:spPr>
+        <p:style>
+          <a:lnRef idx="1">
+            <a:schemeClr val="accent1"/>
+          </a:lnRef>
+          <a:fillRef idx="0">
+            <a:schemeClr val="accent1"/>
+          </a:fillRef>
+          <a:effectRef idx="0">
+            <a:schemeClr val="accent1"/>
+          </a:effectRef>
+          <a:fontRef idx="minor">
+            <a:schemeClr val="tx1"/>
+          </a:fontRef>
+        </p:style>
+      </p:cxnSp>
+      <p:sp>
+        <p:nvSpPr>
+          <p:cNvPr id="19" name="Rectangle 18">
+            <a:extLst>
+              <a:ext uri="{FF2B5EF4-FFF2-40B4-BE49-F238E27FC236}">
+                <a16:creationId xmlns:a16="http://schemas.microsoft.com/office/drawing/2014/main" id="{C0965825-FA3D-30C1-2C27-C6BDFC6C3A15}"/>
+              </a:ext>
+            </a:extLst>
+          </p:cNvPr>
+          <p:cNvSpPr/>
+          <p:nvPr/>
+        </p:nvSpPr>
+        <p:spPr>
+          <a:xfrm>
+            <a:off x="5742800" y="662835"/>
+            <a:ext cx="932544" cy="323579"/>
+          </a:xfrm>
+          <a:prstGeom prst="rect">
+            <a:avLst/>
+          </a:prstGeom>
+          <a:noFill/>
+          <a:ln w="12700" cap="flat" cmpd="sng" algn="ctr">
+            <a:noFill/>
+            <a:prstDash val="solid"/>
+            <a:miter lim="800000"/>
+          </a:ln>
+          <a:effectLst/>
+        </p:spPr>
+        <p:txBody>
+          <a:bodyPr rtlCol="0" anchor="ctr"/>
+          <a:lstStyle/>
+          <a:p>
+            <a:pPr algn="ctr" defTabSz="684886">
+              <a:defRPr/>
+            </a:pPr>
+            <a:r>
+              <a:rPr lang="en-US" sz="1198" kern="0" dirty="0">
+                <a:solidFill>
+                  <a:schemeClr val="bg1">
+                    <a:lumMod val="50000"/>
+                  </a:schemeClr>
+                </a:solidFill>
+                <a:latin typeface="Verdana" panose="020B0604030504040204" pitchFamily="34" charset="0"/>
+                <a:ea typeface="Verdana" panose="020B0604030504040204" pitchFamily="34" charset="0"/>
+              </a:rPr>
+              <a:t>patient</a:t>
+            </a:r>
+          </a:p>
+        </p:txBody>
+      </p:sp>
+      <p:sp>
+        <p:nvSpPr>
+          <p:cNvPr id="20" name="Rectangle 19">
+            <a:extLst>
+              <a:ext uri="{FF2B5EF4-FFF2-40B4-BE49-F238E27FC236}">
+                <a16:creationId xmlns:a16="http://schemas.microsoft.com/office/drawing/2014/main" id="{5AEC2A9F-539A-ED0D-1AA8-8676FB03B06F}"/>
+              </a:ext>
+            </a:extLst>
+          </p:cNvPr>
+          <p:cNvSpPr/>
+          <p:nvPr/>
+        </p:nvSpPr>
+        <p:spPr>
+          <a:xfrm>
+            <a:off x="6730145" y="1964272"/>
+            <a:ext cx="2232000" cy="647157"/>
+          </a:xfrm>
+          <a:prstGeom prst="rect">
+            <a:avLst/>
+          </a:prstGeom>
+          <a:noFill/>
+          <a:ln w="19050" cap="flat" cmpd="sng" algn="ctr">
+            <a:solidFill>
+              <a:srgbClr val="F79646"/>
+            </a:solidFill>
+            <a:prstDash val="solid"/>
+            <a:miter lim="800000"/>
+          </a:ln>
+          <a:effectLst/>
+        </p:spPr>
+        <p:txBody>
+          <a:bodyPr rtlCol="0" anchor="ctr"/>
+          <a:lstStyle/>
+          <a:p>
+            <a:pPr algn="ctr" defTabSz="684886">
+              <a:defRPr/>
+            </a:pPr>
+            <a:r>
+              <a:rPr lang="en-US" sz="1198" kern="0" dirty="0">
+                <a:solidFill>
+                  <a:prstClr val="black"/>
+                </a:solidFill>
+                <a:latin typeface="Verdana" panose="020B0604030504040204" pitchFamily="34" charset="0"/>
+                <a:ea typeface="Verdana" panose="020B0604030504040204" pitchFamily="34" charset="0"/>
+              </a:rPr>
+              <a:t>CH EPREG Observation: Fetal Position</a:t>
+            </a:r>
+          </a:p>
+        </p:txBody>
+      </p:sp>
+      <p:sp>
+        <p:nvSpPr>
+          <p:cNvPr id="21" name="Rectangle 20">
+            <a:extLst>
+              <a:ext uri="{FF2B5EF4-FFF2-40B4-BE49-F238E27FC236}">
+                <a16:creationId xmlns:a16="http://schemas.microsoft.com/office/drawing/2014/main" id="{E8769307-FCB4-77A6-0E8D-484AC13B034F}"/>
+              </a:ext>
+            </a:extLst>
+          </p:cNvPr>
+          <p:cNvSpPr/>
+          <p:nvPr/>
+        </p:nvSpPr>
+        <p:spPr>
+          <a:xfrm>
+            <a:off x="7005678" y="1476509"/>
+            <a:ext cx="932544" cy="323579"/>
+          </a:xfrm>
+          <a:prstGeom prst="rect">
+            <a:avLst/>
+          </a:prstGeom>
+          <a:noFill/>
+          <a:ln w="12700" cap="flat" cmpd="sng" algn="ctr">
+            <a:noFill/>
+            <a:prstDash val="solid"/>
+            <a:miter lim="800000"/>
+          </a:ln>
+          <a:effectLst/>
+        </p:spPr>
+        <p:txBody>
+          <a:bodyPr rtlCol="0" anchor="ctr"/>
+          <a:lstStyle/>
+          <a:p>
+            <a:pPr algn="ctr" defTabSz="684886">
+              <a:defRPr/>
+            </a:pPr>
+            <a:r>
+              <a:rPr lang="en-US" sz="1198" kern="0" dirty="0">
+                <a:solidFill>
+                  <a:schemeClr val="bg1">
+                    <a:lumMod val="50000"/>
+                  </a:schemeClr>
+                </a:solidFill>
+                <a:latin typeface="Verdana" panose="020B0604030504040204" pitchFamily="34" charset="0"/>
+                <a:ea typeface="Verdana" panose="020B0604030504040204" pitchFamily="34" charset="0"/>
+              </a:rPr>
+              <a:t>subject</a:t>
+            </a:r>
+          </a:p>
+        </p:txBody>
+      </p:sp>
+      <p:cxnSp>
+        <p:nvCxnSpPr>
+          <p:cNvPr id="23" name="Straight Arrow Connector 22">
+            <a:extLst>
+              <a:ext uri="{FF2B5EF4-FFF2-40B4-BE49-F238E27FC236}">
+                <a16:creationId xmlns:a16="http://schemas.microsoft.com/office/drawing/2014/main" id="{1AB411BF-75A4-6F8C-8D98-A0A6F9C6021E}"/>
+              </a:ext>
+            </a:extLst>
+          </p:cNvPr>
+          <p:cNvCxnSpPr>
+            <a:cxnSpLocks/>
+            <a:stCxn id="28" idx="0"/>
+            <a:endCxn id="12" idx="2"/>
+          </p:cNvCxnSpPr>
+          <p:nvPr/>
+        </p:nvCxnSpPr>
+        <p:spPr>
+          <a:xfrm flipV="1">
+            <a:off x="1297855" y="1312325"/>
+            <a:ext cx="0" cy="651948"/>
+          </a:xfrm>
+          <a:prstGeom prst="straightConnector1">
+            <a:avLst/>
+          </a:prstGeom>
+          <a:ln w="19050">
+            <a:solidFill>
+              <a:srgbClr val="B6B6B6"/>
+            </a:solidFill>
+            <a:tailEnd type="triangle"/>
+          </a:ln>
+        </p:spPr>
+        <p:style>
+          <a:lnRef idx="1">
+            <a:schemeClr val="accent1"/>
+          </a:lnRef>
+          <a:fillRef idx="0">
+            <a:schemeClr val="accent1"/>
+          </a:fillRef>
+          <a:effectRef idx="0">
+            <a:schemeClr val="accent1"/>
+          </a:effectRef>
+          <a:fontRef idx="minor">
+            <a:schemeClr val="tx1"/>
+          </a:fontRef>
+        </p:style>
+      </p:cxnSp>
+      <p:sp>
+        <p:nvSpPr>
+          <p:cNvPr id="24" name="Rectangle 23">
+            <a:extLst>
+              <a:ext uri="{FF2B5EF4-FFF2-40B4-BE49-F238E27FC236}">
+                <a16:creationId xmlns:a16="http://schemas.microsoft.com/office/drawing/2014/main" id="{255FE7A0-7311-ADCB-3410-C40E888C7FF7}"/>
+              </a:ext>
+            </a:extLst>
+          </p:cNvPr>
+          <p:cNvSpPr/>
+          <p:nvPr/>
+        </p:nvSpPr>
+        <p:spPr>
+          <a:xfrm>
+            <a:off x="1223107" y="1476509"/>
+            <a:ext cx="932544" cy="323579"/>
+          </a:xfrm>
+          <a:prstGeom prst="rect">
+            <a:avLst/>
+          </a:prstGeom>
+          <a:noFill/>
+          <a:ln w="12700" cap="flat" cmpd="sng" algn="ctr">
+            <a:noFill/>
+            <a:prstDash val="solid"/>
+            <a:miter lim="800000"/>
+          </a:ln>
+          <a:effectLst/>
+        </p:spPr>
+        <p:txBody>
+          <a:bodyPr rtlCol="0" anchor="ctr"/>
+          <a:lstStyle/>
+          <a:p>
+            <a:pPr algn="ctr" defTabSz="684886">
+              <a:defRPr/>
+            </a:pPr>
+            <a:r>
+              <a:rPr lang="en-US" sz="1198" kern="0" dirty="0">
+                <a:solidFill>
+                  <a:schemeClr val="bg1">
+                    <a:lumMod val="50000"/>
+                  </a:schemeClr>
+                </a:solidFill>
+                <a:latin typeface="Verdana" panose="020B0604030504040204" pitchFamily="34" charset="0"/>
+                <a:ea typeface="Verdana" panose="020B0604030504040204" pitchFamily="34" charset="0"/>
+              </a:rPr>
+              <a:t>subject</a:t>
+            </a:r>
+          </a:p>
+        </p:txBody>
+      </p:sp>
+      <p:cxnSp>
+        <p:nvCxnSpPr>
+          <p:cNvPr id="25" name="Straight Arrow Connector 24">
+            <a:extLst>
+              <a:ext uri="{FF2B5EF4-FFF2-40B4-BE49-F238E27FC236}">
+                <a16:creationId xmlns:a16="http://schemas.microsoft.com/office/drawing/2014/main" id="{A1F3E05A-D2C6-8491-48AC-61A10631EB52}"/>
+              </a:ext>
+            </a:extLst>
+          </p:cNvPr>
+          <p:cNvCxnSpPr>
+            <a:cxnSpLocks/>
+            <a:stCxn id="20" idx="0"/>
+            <a:endCxn id="8" idx="2"/>
+          </p:cNvCxnSpPr>
+          <p:nvPr/>
+        </p:nvCxnSpPr>
+        <p:spPr>
+          <a:xfrm flipV="1">
+            <a:off x="7846145" y="1312325"/>
+            <a:ext cx="0" cy="651947"/>
+          </a:xfrm>
+          <a:prstGeom prst="straightConnector1">
+            <a:avLst/>
+          </a:prstGeom>
+          <a:ln w="19050">
+            <a:solidFill>
+              <a:srgbClr val="B6B6B6"/>
+            </a:solidFill>
+            <a:tailEnd type="triangle"/>
+          </a:ln>
+        </p:spPr>
+        <p:style>
+          <a:lnRef idx="1">
+            <a:schemeClr val="accent1"/>
+          </a:lnRef>
+          <a:fillRef idx="0">
+            <a:schemeClr val="accent1"/>
+          </a:fillRef>
+          <a:effectRef idx="0">
+            <a:schemeClr val="accent1"/>
+          </a:effectRef>
+          <a:fontRef idx="minor">
+            <a:schemeClr val="tx1"/>
+          </a:fontRef>
+        </p:style>
+      </p:cxnSp>
+      <p:sp>
+        <p:nvSpPr>
+          <p:cNvPr id="28" name="Rectangle 27">
+            <a:extLst>
+              <a:ext uri="{FF2B5EF4-FFF2-40B4-BE49-F238E27FC236}">
+                <a16:creationId xmlns:a16="http://schemas.microsoft.com/office/drawing/2014/main" id="{3808CA61-6564-7AA0-E3F0-F50B0565131E}"/>
+              </a:ext>
+            </a:extLst>
+          </p:cNvPr>
+          <p:cNvSpPr/>
+          <p:nvPr/>
+        </p:nvSpPr>
+        <p:spPr>
+          <a:xfrm>
+            <a:off x="181855" y="1964273"/>
+            <a:ext cx="2232000" cy="647157"/>
+          </a:xfrm>
+          <a:prstGeom prst="rect">
+            <a:avLst/>
+          </a:prstGeom>
+          <a:noFill/>
+          <a:ln w="19050" cap="flat" cmpd="sng" algn="ctr">
+            <a:solidFill>
+              <a:srgbClr val="C00000"/>
+            </a:solidFill>
+            <a:prstDash val="solid"/>
+            <a:miter lim="800000"/>
+          </a:ln>
+          <a:effectLst/>
+        </p:spPr>
+        <p:txBody>
+          <a:bodyPr rtlCol="0" anchor="ctr"/>
+          <a:lstStyle/>
+          <a:p>
+            <a:pPr algn="ctr" defTabSz="684886">
+              <a:defRPr/>
+            </a:pPr>
+            <a:r>
+              <a:rPr lang="en-US" sz="1198" kern="0" dirty="0">
+                <a:solidFill>
+                  <a:prstClr val="black"/>
+                </a:solidFill>
+                <a:latin typeface="Verdana" panose="020B0604030504040204" pitchFamily="34" charset="0"/>
+                <a:ea typeface="Verdana" panose="020B0604030504040204" pitchFamily="34" charset="0"/>
+              </a:rPr>
+              <a:t>CH EPREG Observation:</a:t>
+            </a:r>
+            <a:br>
+              <a:rPr lang="en-US" sz="1198" kern="0" dirty="0">
+                <a:solidFill>
+                  <a:prstClr val="black"/>
+                </a:solidFill>
+                <a:latin typeface="Verdana" panose="020B0604030504040204" pitchFamily="34" charset="0"/>
+                <a:ea typeface="Verdana" panose="020B0604030504040204" pitchFamily="34" charset="0"/>
+              </a:rPr>
+            </a:br>
+            <a:r>
+              <a:rPr lang="en-US" sz="1198" kern="0" dirty="0">
+                <a:solidFill>
+                  <a:prstClr val="black"/>
+                </a:solidFill>
+                <a:latin typeface="Verdana" panose="020B0604030504040204" pitchFamily="34" charset="0"/>
+                <a:ea typeface="Verdana" panose="020B0604030504040204" pitchFamily="34" charset="0"/>
+              </a:rPr>
+              <a:t>Gestational Age</a:t>
+            </a:r>
+            <a:endParaRPr lang="en-US" sz="1348" kern="0" dirty="0">
+              <a:solidFill>
+                <a:prstClr val="black"/>
+              </a:solidFill>
+              <a:latin typeface="Verdana" panose="020B0604030504040204" pitchFamily="34" charset="0"/>
+              <a:ea typeface="Verdana" panose="020B0604030504040204" pitchFamily="34" charset="0"/>
+            </a:endParaRPr>
+          </a:p>
+        </p:txBody>
+      </p:sp>
+      <p:sp>
+        <p:nvSpPr>
+          <p:cNvPr id="49" name="Rectangle 48">
+            <a:extLst>
+              <a:ext uri="{FF2B5EF4-FFF2-40B4-BE49-F238E27FC236}">
+                <a16:creationId xmlns:a16="http://schemas.microsoft.com/office/drawing/2014/main" id="{FCB500B3-D7D9-60D6-9003-10D2A1E52362}"/>
+              </a:ext>
+            </a:extLst>
+          </p:cNvPr>
+          <p:cNvSpPr/>
+          <p:nvPr/>
+        </p:nvSpPr>
+        <p:spPr>
+          <a:xfrm>
+            <a:off x="181855" y="4173581"/>
+            <a:ext cx="2232000" cy="647157"/>
+          </a:xfrm>
+          <a:prstGeom prst="rect">
+            <a:avLst/>
+          </a:prstGeom>
+          <a:noFill/>
+          <a:ln w="19050" cap="flat" cmpd="sng" algn="ctr">
+            <a:solidFill>
+              <a:srgbClr val="C00000"/>
+            </a:solidFill>
+            <a:prstDash val="solid"/>
+            <a:miter lim="800000"/>
+          </a:ln>
+          <a:effectLst/>
+        </p:spPr>
+        <p:txBody>
+          <a:bodyPr rtlCol="0" anchor="ctr"/>
+          <a:lstStyle/>
+          <a:p>
+            <a:pPr algn="ctr" defTabSz="684886">
+              <a:defRPr/>
+            </a:pPr>
+            <a:r>
+              <a:rPr lang="en-US" sz="1198" kern="0" dirty="0">
+                <a:solidFill>
+                  <a:prstClr val="black"/>
+                </a:solidFill>
+                <a:latin typeface="Verdana" panose="020B0604030504040204" pitchFamily="34" charset="0"/>
+                <a:ea typeface="Verdana" panose="020B0604030504040204" pitchFamily="34" charset="0"/>
+              </a:rPr>
+              <a:t>CH EPREG Patient:</a:t>
+            </a:r>
+            <a:br>
+              <a:rPr lang="en-US" sz="1198" kern="0" dirty="0">
+                <a:solidFill>
+                  <a:prstClr val="black"/>
+                </a:solidFill>
+                <a:latin typeface="Verdana" panose="020B0604030504040204" pitchFamily="34" charset="0"/>
+                <a:ea typeface="Verdana" panose="020B0604030504040204" pitchFamily="34" charset="0"/>
+              </a:rPr>
+            </a:br>
+            <a:r>
+              <a:rPr lang="en-US" sz="1198" kern="0" dirty="0">
+                <a:solidFill>
+                  <a:prstClr val="black"/>
+                </a:solidFill>
+                <a:latin typeface="Verdana" panose="020B0604030504040204" pitchFamily="34" charset="0"/>
+                <a:ea typeface="Verdana" panose="020B0604030504040204" pitchFamily="34" charset="0"/>
+              </a:rPr>
+              <a:t>Mother</a:t>
+            </a:r>
+            <a:endParaRPr lang="en-US" sz="1348" kern="0" dirty="0">
+              <a:solidFill>
+                <a:prstClr val="black"/>
+              </a:solidFill>
+              <a:latin typeface="Verdana" panose="020B0604030504040204" pitchFamily="34" charset="0"/>
+              <a:ea typeface="Verdana" panose="020B0604030504040204" pitchFamily="34" charset="0"/>
+            </a:endParaRPr>
+          </a:p>
+        </p:txBody>
+      </p:sp>
+      <p:sp>
+        <p:nvSpPr>
+          <p:cNvPr id="50" name="Rectangle 49">
+            <a:extLst>
+              <a:ext uri="{FF2B5EF4-FFF2-40B4-BE49-F238E27FC236}">
+                <a16:creationId xmlns:a16="http://schemas.microsoft.com/office/drawing/2014/main" id="{7679FFE5-B3FF-A201-33A2-C5B670DE39B9}"/>
+              </a:ext>
+            </a:extLst>
+          </p:cNvPr>
+          <p:cNvSpPr/>
+          <p:nvPr/>
+        </p:nvSpPr>
+        <p:spPr>
+          <a:xfrm>
+            <a:off x="3456000" y="3526424"/>
+            <a:ext cx="2232000" cy="647157"/>
+          </a:xfrm>
+          <a:prstGeom prst="rect">
+            <a:avLst/>
+          </a:prstGeom>
+          <a:noFill/>
+          <a:ln w="19050" cap="flat" cmpd="sng" algn="ctr">
+            <a:solidFill>
+              <a:srgbClr val="A72931"/>
+            </a:solidFill>
+            <a:prstDash val="solid"/>
+            <a:miter lim="800000"/>
+          </a:ln>
+          <a:effectLst/>
+        </p:spPr>
+        <p:txBody>
+          <a:bodyPr rtlCol="0" anchor="ctr"/>
+          <a:lstStyle/>
+          <a:p>
+            <a:pPr algn="ctr" defTabSz="684886">
+              <a:defRPr/>
+            </a:pPr>
+            <a:r>
+              <a:rPr lang="en-US" sz="1198" kern="0" dirty="0">
+                <a:solidFill>
+                  <a:prstClr val="black"/>
+                </a:solidFill>
+                <a:latin typeface="Verdana" panose="020B0604030504040204" pitchFamily="34" charset="0"/>
+                <a:ea typeface="Verdana" panose="020B0604030504040204" pitchFamily="34" charset="0"/>
+              </a:rPr>
+              <a:t>CH EPREG RelatedPerson:</a:t>
+            </a:r>
+            <a:br>
+              <a:rPr lang="en-US" sz="1198" kern="0" dirty="0">
+                <a:solidFill>
+                  <a:prstClr val="black"/>
+                </a:solidFill>
+                <a:latin typeface="Verdana" panose="020B0604030504040204" pitchFamily="34" charset="0"/>
+                <a:ea typeface="Verdana" panose="020B0604030504040204" pitchFamily="34" charset="0"/>
+              </a:rPr>
+            </a:br>
+            <a:r>
+              <a:rPr lang="en-US" sz="1198" kern="0" dirty="0">
+                <a:solidFill>
+                  <a:prstClr val="black"/>
+                </a:solidFill>
+                <a:latin typeface="Verdana" panose="020B0604030504040204" pitchFamily="34" charset="0"/>
+                <a:ea typeface="Verdana" panose="020B0604030504040204" pitchFamily="34" charset="0"/>
+              </a:rPr>
+              <a:t>Mother of Fetus A</a:t>
+            </a:r>
+            <a:endParaRPr lang="en-US" sz="899" kern="0" dirty="0">
+              <a:solidFill>
+                <a:prstClr val="black"/>
+              </a:solidFill>
+              <a:latin typeface="Verdana" panose="020B0604030504040204" pitchFamily="34" charset="0"/>
+              <a:ea typeface="Verdana" panose="020B0604030504040204" pitchFamily="34" charset="0"/>
+            </a:endParaRPr>
+          </a:p>
+        </p:txBody>
+      </p:sp>
+      <p:sp>
+        <p:nvSpPr>
+          <p:cNvPr id="51" name="Rectangle 50">
+            <a:extLst>
+              <a:ext uri="{FF2B5EF4-FFF2-40B4-BE49-F238E27FC236}">
+                <a16:creationId xmlns:a16="http://schemas.microsoft.com/office/drawing/2014/main" id="{5247688D-C917-4600-044E-E8437AB4FF5F}"/>
+              </a:ext>
+            </a:extLst>
+          </p:cNvPr>
+          <p:cNvSpPr/>
+          <p:nvPr/>
+        </p:nvSpPr>
+        <p:spPr>
+          <a:xfrm>
+            <a:off x="2468655" y="3635707"/>
+            <a:ext cx="932544" cy="323579"/>
+          </a:xfrm>
+          <a:prstGeom prst="rect">
+            <a:avLst/>
+          </a:prstGeom>
+          <a:noFill/>
+          <a:ln w="12700" cap="flat" cmpd="sng" algn="ctr">
+            <a:noFill/>
+            <a:prstDash val="solid"/>
+            <a:miter lim="800000"/>
+          </a:ln>
+          <a:effectLst/>
+        </p:spPr>
+        <p:txBody>
+          <a:bodyPr rtlCol="0" anchor="ctr"/>
+          <a:lstStyle/>
+          <a:p>
+            <a:pPr algn="ctr" defTabSz="684886">
+              <a:defRPr/>
+            </a:pPr>
+            <a:r>
+              <a:rPr lang="en-US" sz="1198" kern="0" dirty="0">
+                <a:solidFill>
+                  <a:schemeClr val="bg1">
+                    <a:lumMod val="50000"/>
+                  </a:schemeClr>
+                </a:solidFill>
+                <a:latin typeface="Verdana" panose="020B0604030504040204" pitchFamily="34" charset="0"/>
+                <a:ea typeface="Verdana" panose="020B0604030504040204" pitchFamily="34" charset="0"/>
+              </a:rPr>
+              <a:t>link.other</a:t>
+            </a:r>
+          </a:p>
+        </p:txBody>
+      </p:sp>
+      <p:cxnSp>
+        <p:nvCxnSpPr>
+          <p:cNvPr id="52" name="Straight Arrow Connector 51">
+            <a:extLst>
+              <a:ext uri="{FF2B5EF4-FFF2-40B4-BE49-F238E27FC236}">
+                <a16:creationId xmlns:a16="http://schemas.microsoft.com/office/drawing/2014/main" id="{CF39BD86-FF58-86EF-E9F7-9B2D511CDA34}"/>
+              </a:ext>
+            </a:extLst>
+          </p:cNvPr>
+          <p:cNvCxnSpPr>
+            <a:cxnSpLocks/>
+            <a:stCxn id="49" idx="3"/>
+            <a:endCxn id="50" idx="1"/>
+          </p:cNvCxnSpPr>
+          <p:nvPr/>
+        </p:nvCxnSpPr>
+        <p:spPr>
+          <a:xfrm flipV="1">
+            <a:off x="2413855" y="3850003"/>
+            <a:ext cx="1042145" cy="647157"/>
+          </a:xfrm>
+          <a:prstGeom prst="straightConnector1">
+            <a:avLst/>
+          </a:prstGeom>
+          <a:ln w="19050">
+            <a:solidFill>
+              <a:srgbClr val="B6B6B6"/>
+            </a:solidFill>
+            <a:tailEnd type="triangle"/>
+          </a:ln>
+        </p:spPr>
+        <p:style>
+          <a:lnRef idx="1">
+            <a:schemeClr val="accent1"/>
+          </a:lnRef>
+          <a:fillRef idx="0">
+            <a:schemeClr val="accent1"/>
+          </a:fillRef>
+          <a:effectRef idx="0">
+            <a:schemeClr val="accent1"/>
+          </a:effectRef>
+          <a:fontRef idx="minor">
+            <a:schemeClr val="tx1"/>
+          </a:fontRef>
+        </p:style>
+      </p:cxnSp>
+      <p:sp>
+        <p:nvSpPr>
+          <p:cNvPr id="53" name="Rectangle 52">
+            <a:extLst>
+              <a:ext uri="{FF2B5EF4-FFF2-40B4-BE49-F238E27FC236}">
+                <a16:creationId xmlns:a16="http://schemas.microsoft.com/office/drawing/2014/main" id="{7C8BACE4-DCC1-7980-6DA7-5A266615135F}"/>
+              </a:ext>
+            </a:extLst>
+          </p:cNvPr>
+          <p:cNvSpPr/>
+          <p:nvPr/>
+        </p:nvSpPr>
+        <p:spPr>
+          <a:xfrm>
+            <a:off x="6730145" y="3526424"/>
+            <a:ext cx="2232000" cy="647157"/>
+          </a:xfrm>
+          <a:prstGeom prst="rect">
+            <a:avLst/>
+          </a:prstGeom>
+          <a:noFill/>
+          <a:ln w="19050" cap="flat" cmpd="sng" algn="ctr">
+            <a:solidFill>
+              <a:srgbClr val="F79646"/>
+            </a:solidFill>
+            <a:prstDash val="solid"/>
+            <a:miter lim="800000"/>
+          </a:ln>
+          <a:effectLst/>
+        </p:spPr>
+        <p:txBody>
+          <a:bodyPr rtlCol="0" anchor="ctr"/>
+          <a:lstStyle/>
+          <a:p>
+            <a:pPr algn="ctr" defTabSz="684886">
+              <a:defRPr/>
+            </a:pPr>
+            <a:r>
+              <a:rPr lang="en-US" sz="1198" kern="0" dirty="0">
+                <a:solidFill>
+                  <a:prstClr val="black"/>
+                </a:solidFill>
+                <a:latin typeface="Verdana" panose="020B0604030504040204" pitchFamily="34" charset="0"/>
+                <a:ea typeface="Verdana" panose="020B0604030504040204" pitchFamily="34" charset="0"/>
+              </a:rPr>
+              <a:t>CH EPREG Patient:</a:t>
+            </a:r>
+            <a:br>
+              <a:rPr lang="en-US" sz="1198" kern="0" dirty="0">
+                <a:solidFill>
+                  <a:prstClr val="black"/>
+                </a:solidFill>
+                <a:latin typeface="Verdana" panose="020B0604030504040204" pitchFamily="34" charset="0"/>
+                <a:ea typeface="Verdana" panose="020B0604030504040204" pitchFamily="34" charset="0"/>
+              </a:rPr>
+            </a:br>
+            <a:r>
+              <a:rPr lang="en-US" sz="1198" kern="0" dirty="0">
+                <a:solidFill>
+                  <a:prstClr val="black"/>
+                </a:solidFill>
+                <a:latin typeface="Verdana" panose="020B0604030504040204" pitchFamily="34" charset="0"/>
+                <a:ea typeface="Verdana" panose="020B0604030504040204" pitchFamily="34" charset="0"/>
+              </a:rPr>
+              <a:t>Fetus B</a:t>
+            </a:r>
+            <a:endParaRPr lang="en-US" sz="899" kern="0" dirty="0">
+              <a:solidFill>
+                <a:prstClr val="black"/>
+              </a:solidFill>
+              <a:latin typeface="Verdana" panose="020B0604030504040204" pitchFamily="34" charset="0"/>
+              <a:ea typeface="Verdana" panose="020B0604030504040204" pitchFamily="34" charset="0"/>
+            </a:endParaRPr>
+          </a:p>
+        </p:txBody>
+      </p:sp>
+      <p:cxnSp>
+        <p:nvCxnSpPr>
+          <p:cNvPr id="54" name="Straight Arrow Connector 53">
+            <a:extLst>
+              <a:ext uri="{FF2B5EF4-FFF2-40B4-BE49-F238E27FC236}">
+                <a16:creationId xmlns:a16="http://schemas.microsoft.com/office/drawing/2014/main" id="{1B95EB01-7495-953D-4EF4-71A3A5EBCC9A}"/>
+              </a:ext>
+            </a:extLst>
+          </p:cNvPr>
+          <p:cNvCxnSpPr>
+            <a:cxnSpLocks/>
+            <a:stCxn id="50" idx="3"/>
+            <a:endCxn id="53" idx="1"/>
+          </p:cNvCxnSpPr>
+          <p:nvPr/>
+        </p:nvCxnSpPr>
+        <p:spPr>
+          <a:xfrm>
+            <a:off x="5688000" y="3850003"/>
+            <a:ext cx="1042145" cy="0"/>
+          </a:xfrm>
+          <a:prstGeom prst="straightConnector1">
+            <a:avLst/>
+          </a:prstGeom>
+          <a:ln w="19050">
+            <a:solidFill>
+              <a:srgbClr val="B6B6B6"/>
+            </a:solidFill>
+            <a:tailEnd type="triangle"/>
+          </a:ln>
+        </p:spPr>
+        <p:style>
+          <a:lnRef idx="1">
+            <a:schemeClr val="accent1"/>
+          </a:lnRef>
+          <a:fillRef idx="0">
+            <a:schemeClr val="accent1"/>
+          </a:fillRef>
+          <a:effectRef idx="0">
+            <a:schemeClr val="accent1"/>
+          </a:effectRef>
+          <a:fontRef idx="minor">
+            <a:schemeClr val="tx1"/>
+          </a:fontRef>
+        </p:style>
+      </p:cxnSp>
+      <p:sp>
+        <p:nvSpPr>
+          <p:cNvPr id="55" name="Rectangle 54">
+            <a:extLst>
+              <a:ext uri="{FF2B5EF4-FFF2-40B4-BE49-F238E27FC236}">
+                <a16:creationId xmlns:a16="http://schemas.microsoft.com/office/drawing/2014/main" id="{74BCE285-F2DB-72A3-70A9-56BE33529C0D}"/>
+              </a:ext>
+            </a:extLst>
+          </p:cNvPr>
+          <p:cNvSpPr/>
+          <p:nvPr/>
+        </p:nvSpPr>
+        <p:spPr>
+          <a:xfrm>
+            <a:off x="5742800" y="3524091"/>
+            <a:ext cx="932544" cy="323579"/>
+          </a:xfrm>
+          <a:prstGeom prst="rect">
+            <a:avLst/>
+          </a:prstGeom>
+          <a:noFill/>
+          <a:ln w="12700" cap="flat" cmpd="sng" algn="ctr">
+            <a:noFill/>
+            <a:prstDash val="solid"/>
+            <a:miter lim="800000"/>
+          </a:ln>
+          <a:effectLst/>
+        </p:spPr>
+        <p:txBody>
+          <a:bodyPr rtlCol="0" anchor="ctr"/>
+          <a:lstStyle/>
+          <a:p>
+            <a:pPr algn="ctr" defTabSz="684886">
+              <a:defRPr/>
+            </a:pPr>
+            <a:r>
+              <a:rPr lang="en-US" sz="1198" kern="0" dirty="0">
+                <a:solidFill>
+                  <a:schemeClr val="bg1">
+                    <a:lumMod val="50000"/>
+                  </a:schemeClr>
+                </a:solidFill>
+                <a:latin typeface="Verdana" panose="020B0604030504040204" pitchFamily="34" charset="0"/>
+                <a:ea typeface="Verdana" panose="020B0604030504040204" pitchFamily="34" charset="0"/>
+              </a:rPr>
+              <a:t>patient</a:t>
+            </a:r>
+          </a:p>
+        </p:txBody>
+      </p:sp>
+      <p:sp>
+        <p:nvSpPr>
+          <p:cNvPr id="62" name="Rectangle 61">
+            <a:extLst>
+              <a:ext uri="{FF2B5EF4-FFF2-40B4-BE49-F238E27FC236}">
+                <a16:creationId xmlns:a16="http://schemas.microsoft.com/office/drawing/2014/main" id="{60138331-926A-CF1F-EF6A-417FDEC25A68}"/>
+              </a:ext>
+            </a:extLst>
+          </p:cNvPr>
+          <p:cNvSpPr/>
+          <p:nvPr/>
+        </p:nvSpPr>
+        <p:spPr>
+          <a:xfrm>
+            <a:off x="3456000" y="4820738"/>
+            <a:ext cx="2232000" cy="647157"/>
+          </a:xfrm>
+          <a:prstGeom prst="rect">
+            <a:avLst/>
+          </a:prstGeom>
+          <a:noFill/>
+          <a:ln w="19050" cap="flat" cmpd="sng" algn="ctr">
+            <a:solidFill>
+              <a:srgbClr val="A72931"/>
+            </a:solidFill>
+            <a:prstDash val="solid"/>
+            <a:miter lim="800000"/>
+          </a:ln>
+          <a:effectLst/>
+        </p:spPr>
+        <p:txBody>
+          <a:bodyPr rtlCol="0" anchor="ctr"/>
+          <a:lstStyle/>
+          <a:p>
+            <a:pPr algn="ctr" defTabSz="684886">
+              <a:defRPr/>
+            </a:pPr>
+            <a:r>
+              <a:rPr lang="en-US" sz="1198" kern="0" dirty="0">
+                <a:solidFill>
+                  <a:prstClr val="black"/>
+                </a:solidFill>
+                <a:latin typeface="Verdana" panose="020B0604030504040204" pitchFamily="34" charset="0"/>
+                <a:ea typeface="Verdana" panose="020B0604030504040204" pitchFamily="34" charset="0"/>
+              </a:rPr>
+              <a:t>CH EPREG RelatedPerson:</a:t>
+            </a:r>
+            <a:br>
+              <a:rPr lang="en-US" sz="1198" kern="0" dirty="0">
+                <a:solidFill>
+                  <a:prstClr val="black"/>
+                </a:solidFill>
+                <a:latin typeface="Verdana" panose="020B0604030504040204" pitchFamily="34" charset="0"/>
+                <a:ea typeface="Verdana" panose="020B0604030504040204" pitchFamily="34" charset="0"/>
+              </a:rPr>
+            </a:br>
+            <a:r>
+              <a:rPr lang="en-US" sz="1198" kern="0" dirty="0">
+                <a:solidFill>
+                  <a:prstClr val="black"/>
+                </a:solidFill>
+                <a:latin typeface="Verdana" panose="020B0604030504040204" pitchFamily="34" charset="0"/>
+                <a:ea typeface="Verdana" panose="020B0604030504040204" pitchFamily="34" charset="0"/>
+              </a:rPr>
+              <a:t>Mother of </a:t>
+            </a:r>
+            <a:r>
+              <a:rPr lang="en-US" sz="1198" kern="0">
+                <a:solidFill>
+                  <a:prstClr val="black"/>
+                </a:solidFill>
+                <a:latin typeface="Verdana" panose="020B0604030504040204" pitchFamily="34" charset="0"/>
+                <a:ea typeface="Verdana" panose="020B0604030504040204" pitchFamily="34" charset="0"/>
+              </a:rPr>
+              <a:t>Fetus B</a:t>
+            </a:r>
+            <a:endParaRPr lang="en-US" sz="899" kern="0" dirty="0">
+              <a:solidFill>
+                <a:prstClr val="black"/>
+              </a:solidFill>
+              <a:latin typeface="Verdana" panose="020B0604030504040204" pitchFamily="34" charset="0"/>
+              <a:ea typeface="Verdana" panose="020B0604030504040204" pitchFamily="34" charset="0"/>
+            </a:endParaRPr>
+          </a:p>
+        </p:txBody>
+      </p:sp>
+      <p:cxnSp>
+        <p:nvCxnSpPr>
+          <p:cNvPr id="64" name="Straight Arrow Connector 63">
+            <a:extLst>
+              <a:ext uri="{FF2B5EF4-FFF2-40B4-BE49-F238E27FC236}">
+                <a16:creationId xmlns:a16="http://schemas.microsoft.com/office/drawing/2014/main" id="{F3143A80-C524-BA8C-8A70-B1E56B20EB49}"/>
+              </a:ext>
+            </a:extLst>
+          </p:cNvPr>
+          <p:cNvCxnSpPr>
+            <a:cxnSpLocks/>
+            <a:stCxn id="49" idx="3"/>
+            <a:endCxn id="62" idx="1"/>
+          </p:cNvCxnSpPr>
+          <p:nvPr/>
+        </p:nvCxnSpPr>
+        <p:spPr>
+          <a:xfrm>
+            <a:off x="2413855" y="4497160"/>
+            <a:ext cx="1042145" cy="647157"/>
+          </a:xfrm>
+          <a:prstGeom prst="straightConnector1">
+            <a:avLst/>
+          </a:prstGeom>
+          <a:ln w="19050">
+            <a:solidFill>
+              <a:srgbClr val="B6B6B6"/>
+            </a:solidFill>
+            <a:tailEnd type="triangle"/>
+          </a:ln>
+        </p:spPr>
+        <p:style>
+          <a:lnRef idx="1">
+            <a:schemeClr val="accent1"/>
+          </a:lnRef>
+          <a:fillRef idx="0">
+            <a:schemeClr val="accent1"/>
+          </a:fillRef>
+          <a:effectRef idx="0">
+            <a:schemeClr val="accent1"/>
+          </a:effectRef>
+          <a:fontRef idx="minor">
+            <a:schemeClr val="tx1"/>
+          </a:fontRef>
+        </p:style>
+      </p:cxnSp>
+      <p:sp>
+        <p:nvSpPr>
+          <p:cNvPr id="67" name="Rectangle 66">
+            <a:extLst>
+              <a:ext uri="{FF2B5EF4-FFF2-40B4-BE49-F238E27FC236}">
+                <a16:creationId xmlns:a16="http://schemas.microsoft.com/office/drawing/2014/main" id="{B63D90D7-659C-EC6E-20D2-BE5674095AAA}"/>
+              </a:ext>
+            </a:extLst>
+          </p:cNvPr>
+          <p:cNvSpPr/>
+          <p:nvPr/>
+        </p:nvSpPr>
+        <p:spPr>
+          <a:xfrm>
+            <a:off x="2468655" y="5050237"/>
+            <a:ext cx="932544" cy="323579"/>
+          </a:xfrm>
+          <a:prstGeom prst="rect">
+            <a:avLst/>
+          </a:prstGeom>
+          <a:noFill/>
+          <a:ln w="12700" cap="flat" cmpd="sng" algn="ctr">
+            <a:noFill/>
+            <a:prstDash val="solid"/>
+            <a:miter lim="800000"/>
+          </a:ln>
+          <a:effectLst/>
+        </p:spPr>
+        <p:txBody>
+          <a:bodyPr rtlCol="0" anchor="ctr"/>
+          <a:lstStyle/>
+          <a:p>
+            <a:pPr algn="ctr" defTabSz="684886">
+              <a:defRPr/>
+            </a:pPr>
+            <a:r>
+              <a:rPr lang="en-US" sz="1198" kern="0" dirty="0">
+                <a:solidFill>
+                  <a:schemeClr val="bg1">
+                    <a:lumMod val="50000"/>
+                  </a:schemeClr>
+                </a:solidFill>
+                <a:latin typeface="Verdana" panose="020B0604030504040204" pitchFamily="34" charset="0"/>
+                <a:ea typeface="Verdana" panose="020B0604030504040204" pitchFamily="34" charset="0"/>
+              </a:rPr>
+              <a:t>link.other</a:t>
+            </a:r>
+          </a:p>
+        </p:txBody>
+      </p:sp>
+      <p:sp>
+        <p:nvSpPr>
+          <p:cNvPr id="68" name="Rectangle 67">
+            <a:extLst>
+              <a:ext uri="{FF2B5EF4-FFF2-40B4-BE49-F238E27FC236}">
+                <a16:creationId xmlns:a16="http://schemas.microsoft.com/office/drawing/2014/main" id="{20A3ED70-D665-01C4-5A62-FB97FC3D77AE}"/>
+              </a:ext>
+            </a:extLst>
+          </p:cNvPr>
+          <p:cNvSpPr/>
+          <p:nvPr/>
+        </p:nvSpPr>
+        <p:spPr>
+          <a:xfrm>
+            <a:off x="6730145" y="4820738"/>
+            <a:ext cx="2232000" cy="647157"/>
+          </a:xfrm>
+          <a:prstGeom prst="rect">
+            <a:avLst/>
+          </a:prstGeom>
+          <a:noFill/>
+          <a:ln w="19050" cap="flat" cmpd="sng" algn="ctr">
+            <a:solidFill>
+              <a:srgbClr val="F79646"/>
+            </a:solidFill>
+            <a:prstDash val="solid"/>
+            <a:miter lim="800000"/>
+          </a:ln>
+          <a:effectLst/>
+        </p:spPr>
+        <p:txBody>
+          <a:bodyPr rtlCol="0" anchor="ctr"/>
+          <a:lstStyle/>
+          <a:p>
+            <a:pPr algn="ctr" defTabSz="684886">
+              <a:defRPr/>
+            </a:pPr>
+            <a:r>
+              <a:rPr lang="en-US" sz="1198" kern="0" dirty="0">
+                <a:solidFill>
+                  <a:prstClr val="black"/>
+                </a:solidFill>
+                <a:latin typeface="Verdana" panose="020B0604030504040204" pitchFamily="34" charset="0"/>
+                <a:ea typeface="Verdana" panose="020B0604030504040204" pitchFamily="34" charset="0"/>
+              </a:rPr>
+              <a:t>CH EPREG Patient:</a:t>
+            </a:r>
+            <a:br>
+              <a:rPr lang="en-US" sz="1198" kern="0" dirty="0">
+                <a:solidFill>
+                  <a:prstClr val="black"/>
+                </a:solidFill>
+                <a:latin typeface="Verdana" panose="020B0604030504040204" pitchFamily="34" charset="0"/>
+                <a:ea typeface="Verdana" panose="020B0604030504040204" pitchFamily="34" charset="0"/>
+              </a:rPr>
+            </a:br>
+            <a:r>
+              <a:rPr lang="en-US" sz="1198" kern="0" dirty="0">
+                <a:solidFill>
+                  <a:prstClr val="black"/>
+                </a:solidFill>
+                <a:latin typeface="Verdana" panose="020B0604030504040204" pitchFamily="34" charset="0"/>
+                <a:ea typeface="Verdana" panose="020B0604030504040204" pitchFamily="34" charset="0"/>
+              </a:rPr>
+              <a:t>Fetus B</a:t>
+            </a:r>
+            <a:endParaRPr lang="en-US" sz="899" kern="0" dirty="0">
+              <a:solidFill>
+                <a:prstClr val="black"/>
+              </a:solidFill>
+              <a:latin typeface="Verdana" panose="020B0604030504040204" pitchFamily="34" charset="0"/>
+              <a:ea typeface="Verdana" panose="020B0604030504040204" pitchFamily="34" charset="0"/>
+            </a:endParaRPr>
+          </a:p>
+        </p:txBody>
+      </p:sp>
+      <p:cxnSp>
+        <p:nvCxnSpPr>
+          <p:cNvPr id="69" name="Straight Arrow Connector 68">
+            <a:extLst>
+              <a:ext uri="{FF2B5EF4-FFF2-40B4-BE49-F238E27FC236}">
+                <a16:creationId xmlns:a16="http://schemas.microsoft.com/office/drawing/2014/main" id="{81C6E23E-A44A-0159-84FE-E4EF62838656}"/>
+              </a:ext>
+            </a:extLst>
+          </p:cNvPr>
+          <p:cNvCxnSpPr>
+            <a:cxnSpLocks/>
+          </p:cNvCxnSpPr>
+          <p:nvPr/>
+        </p:nvCxnSpPr>
+        <p:spPr>
+          <a:xfrm>
+            <a:off x="5688000" y="5146650"/>
+            <a:ext cx="1042145" cy="0"/>
+          </a:xfrm>
+          <a:prstGeom prst="straightConnector1">
+            <a:avLst/>
+          </a:prstGeom>
+          <a:ln w="19050">
+            <a:solidFill>
+              <a:srgbClr val="B6B6B6"/>
+            </a:solidFill>
+            <a:tailEnd type="triangle"/>
+          </a:ln>
+        </p:spPr>
+        <p:style>
+          <a:lnRef idx="1">
+            <a:schemeClr val="accent1"/>
+          </a:lnRef>
+          <a:fillRef idx="0">
+            <a:schemeClr val="accent1"/>
+          </a:fillRef>
+          <a:effectRef idx="0">
+            <a:schemeClr val="accent1"/>
+          </a:effectRef>
+          <a:fontRef idx="minor">
+            <a:schemeClr val="tx1"/>
+          </a:fontRef>
+        </p:style>
+      </p:cxnSp>
+      <p:sp>
+        <p:nvSpPr>
+          <p:cNvPr id="70" name="Rectangle 69">
+            <a:extLst>
+              <a:ext uri="{FF2B5EF4-FFF2-40B4-BE49-F238E27FC236}">
+                <a16:creationId xmlns:a16="http://schemas.microsoft.com/office/drawing/2014/main" id="{5DD25B7A-3EF9-4C78-59D4-A9B194B98AC0}"/>
+              </a:ext>
+            </a:extLst>
+          </p:cNvPr>
+          <p:cNvSpPr/>
+          <p:nvPr/>
+        </p:nvSpPr>
+        <p:spPr>
+          <a:xfrm>
+            <a:off x="5742800" y="4820738"/>
+            <a:ext cx="932544" cy="323579"/>
+          </a:xfrm>
+          <a:prstGeom prst="rect">
+            <a:avLst/>
+          </a:prstGeom>
+          <a:noFill/>
+          <a:ln w="12700" cap="flat" cmpd="sng" algn="ctr">
+            <a:noFill/>
+            <a:prstDash val="solid"/>
+            <a:miter lim="800000"/>
+          </a:ln>
+          <a:effectLst/>
+        </p:spPr>
+        <p:txBody>
+          <a:bodyPr rtlCol="0" anchor="ctr"/>
+          <a:lstStyle/>
+          <a:p>
+            <a:pPr algn="ctr" defTabSz="684886">
+              <a:defRPr/>
+            </a:pPr>
+            <a:r>
+              <a:rPr lang="en-US" sz="1198" kern="0" dirty="0">
+                <a:solidFill>
+                  <a:schemeClr val="bg1">
+                    <a:lumMod val="50000"/>
+                  </a:schemeClr>
+                </a:solidFill>
+                <a:latin typeface="Verdana" panose="020B0604030504040204" pitchFamily="34" charset="0"/>
+                <a:ea typeface="Verdana" panose="020B0604030504040204" pitchFamily="34" charset="0"/>
+              </a:rPr>
+              <a:t>patient</a:t>
+            </a:r>
+          </a:p>
+        </p:txBody>
+      </p:sp>
+    </p:spTree>
+    <p:extLst>
+      <p:ext uri="{BB962C8B-B14F-4D97-AF65-F5344CB8AC3E}">
+        <p14:creationId xmlns:p14="http://schemas.microsoft.com/office/powerpoint/2010/main" val="1804212381"/>
       </p:ext>
     </p:extLst>
   </p:cSld>

</xml_diff>

<commit_message>
update mother child relationship
</commit_message>
<xml_diff>
--- a/illustrations.pptx
+++ b/illustrations.pptx
@@ -5,11 +5,12 @@
     <p:sldMasterId id="2147483648" r:id="rId1"/>
   </p:sldMasterIdLst>
   <p:notesMasterIdLst>
-    <p:notesMasterId r:id="rId4"/>
+    <p:notesMasterId r:id="rId5"/>
   </p:notesMasterIdLst>
   <p:sldIdLst>
     <p:sldId id="267" r:id="rId2"/>
     <p:sldId id="1433" r:id="rId3"/>
+    <p:sldId id="1434" r:id="rId4"/>
   </p:sldIdLst>
   <p:sldSz cx="9144000" cy="6858000" type="screen4x3"/>
   <p:notesSz cx="6858000" cy="9144000"/>
@@ -209,7 +210,7 @@
           <a:p>
             <a:fld id="{AA0936E0-B937-435B-957D-29657CD375E8}" type="datetimeFigureOut">
               <a:rPr lang="de-CH" smtClean="0"/>
-              <a:t>09.04.2025</a:t>
+              <a:t>14.04.2025</a:t>
             </a:fld>
             <a:endParaRPr lang="de-CH"/>
           </a:p>
@@ -561,6 +562,114 @@
 </p:notes>
 </file>
 
+<file path=ppt/notesSlides/notesSlide2.xml><?xml version="1.0" encoding="utf-8"?>
+<p:notes xmlns:a="http://schemas.openxmlformats.org/drawingml/2006/main" xmlns:r="http://schemas.openxmlformats.org/officeDocument/2006/relationships" xmlns:p="http://schemas.openxmlformats.org/presentationml/2006/main">
+  <p:cSld>
+    <p:spTree>
+      <p:nvGrpSpPr>
+        <p:cNvPr id="1" name="">
+          <a:extLst>
+            <a:ext uri="{FF2B5EF4-FFF2-40B4-BE49-F238E27FC236}">
+              <a16:creationId xmlns:a16="http://schemas.microsoft.com/office/drawing/2014/main" id="{80B43E8D-A855-A1CF-15C4-383BBAD82ED5}"/>
+            </a:ext>
+          </a:extLst>
+        </p:cNvPr>
+        <p:cNvGrpSpPr/>
+        <p:nvPr/>
+      </p:nvGrpSpPr>
+      <p:grpSpPr>
+        <a:xfrm>
+          <a:off x="0" y="0"/>
+          <a:ext cx="0" cy="0"/>
+          <a:chOff x="0" y="0"/>
+          <a:chExt cx="0" cy="0"/>
+        </a:xfrm>
+      </p:grpSpPr>
+      <p:sp>
+        <p:nvSpPr>
+          <p:cNvPr id="2" name="Slide Image Placeholder 1">
+            <a:extLst>
+              <a:ext uri="{FF2B5EF4-FFF2-40B4-BE49-F238E27FC236}">
+                <a16:creationId xmlns:a16="http://schemas.microsoft.com/office/drawing/2014/main" id="{4B937BB1-D67C-0AF5-D5D4-3F06527F40A5}"/>
+              </a:ext>
+            </a:extLst>
+          </p:cNvPr>
+          <p:cNvSpPr>
+            <a:spLocks noGrp="1" noRot="1" noChangeAspect="1"/>
+          </p:cNvSpPr>
+          <p:nvPr>
+            <p:ph type="sldImg"/>
+          </p:nvPr>
+        </p:nvSpPr>
+        <p:spPr/>
+      </p:sp>
+      <p:sp>
+        <p:nvSpPr>
+          <p:cNvPr id="3" name="Notes Placeholder 2">
+            <a:extLst>
+              <a:ext uri="{FF2B5EF4-FFF2-40B4-BE49-F238E27FC236}">
+                <a16:creationId xmlns:a16="http://schemas.microsoft.com/office/drawing/2014/main" id="{C623F4CB-B9BE-8A82-2304-4C519F1395AF}"/>
+              </a:ext>
+            </a:extLst>
+          </p:cNvPr>
+          <p:cNvSpPr>
+            <a:spLocks noGrp="1"/>
+          </p:cNvSpPr>
+          <p:nvPr>
+            <p:ph type="body" idx="1"/>
+          </p:nvPr>
+        </p:nvSpPr>
+        <p:spPr/>
+        <p:txBody>
+          <a:bodyPr/>
+          <a:lstStyle/>
+          <a:p>
+            <a:endParaRPr lang="en-CH" dirty="0"/>
+          </a:p>
+        </p:txBody>
+      </p:sp>
+      <p:sp>
+        <p:nvSpPr>
+          <p:cNvPr id="4" name="Slide Number Placeholder 3">
+            <a:extLst>
+              <a:ext uri="{FF2B5EF4-FFF2-40B4-BE49-F238E27FC236}">
+                <a16:creationId xmlns:a16="http://schemas.microsoft.com/office/drawing/2014/main" id="{10DCB0B6-6CE4-EE54-E3F9-A283EC23D917}"/>
+              </a:ext>
+            </a:extLst>
+          </p:cNvPr>
+          <p:cNvSpPr>
+            <a:spLocks noGrp="1"/>
+          </p:cNvSpPr>
+          <p:nvPr>
+            <p:ph type="sldNum" sz="quarter" idx="5"/>
+          </p:nvPr>
+        </p:nvSpPr>
+        <p:spPr/>
+        <p:txBody>
+          <a:bodyPr/>
+          <a:lstStyle/>
+          <a:p>
+            <a:fld id="{A69C946F-C9B2-9B49-8DCA-D38D97C43A2F}" type="slidenum">
+              <a:rPr lang="en-US" smtClean="0"/>
+              <a:t>3</a:t>
+            </a:fld>
+            <a:endParaRPr lang="en-US"/>
+          </a:p>
+        </p:txBody>
+      </p:sp>
+    </p:spTree>
+    <p:extLst>
+      <p:ext uri="{BB962C8B-B14F-4D97-AF65-F5344CB8AC3E}">
+        <p14:creationId xmlns:p14="http://schemas.microsoft.com/office/powerpoint/2010/main" val="2736529093"/>
+      </p:ext>
+    </p:extLst>
+  </p:cSld>
+  <p:clrMapOvr>
+    <a:masterClrMapping/>
+  </p:clrMapOvr>
+</p:notes>
+</file>
+
 <file path=ppt/slideLayouts/slideLayout1.xml><?xml version="1.0" encoding="utf-8"?>
 <p:sldLayout xmlns:a="http://schemas.openxmlformats.org/drawingml/2006/main" xmlns:r="http://schemas.openxmlformats.org/officeDocument/2006/relationships" xmlns:p="http://schemas.openxmlformats.org/presentationml/2006/main" type="title" preserve="1">
   <p:cSld name="Titelfolie">
@@ -740,7 +849,7 @@
           <a:p>
             <a:fld id="{DAD4AEBD-E175-AE42-B084-2E4026DB8423}" type="datetimeFigureOut">
               <a:rPr lang="de-DE" smtClean="0"/>
-              <a:t>09.04.2025</a:t>
+              <a:t>14.04.2025</a:t>
             </a:fld>
             <a:endParaRPr lang="de-DE"/>
           </a:p>
@@ -908,7 +1017,7 @@
           <a:p>
             <a:fld id="{DAD4AEBD-E175-AE42-B084-2E4026DB8423}" type="datetimeFigureOut">
               <a:rPr lang="de-DE" smtClean="0"/>
-              <a:t>09.04.2025</a:t>
+              <a:t>14.04.2025</a:t>
             </a:fld>
             <a:endParaRPr lang="de-DE"/>
           </a:p>
@@ -1086,7 +1195,7 @@
           <a:p>
             <a:fld id="{DAD4AEBD-E175-AE42-B084-2E4026DB8423}" type="datetimeFigureOut">
               <a:rPr lang="de-DE" smtClean="0"/>
-              <a:t>09.04.2025</a:t>
+              <a:t>14.04.2025</a:t>
             </a:fld>
             <a:endParaRPr lang="de-DE"/>
           </a:p>
@@ -1541,7 +1650,7 @@
           <a:p>
             <a:fld id="{DAD4AEBD-E175-AE42-B084-2E4026DB8423}" type="datetimeFigureOut">
               <a:rPr lang="de-DE" smtClean="0"/>
-              <a:t>09.04.2025</a:t>
+              <a:t>14.04.2025</a:t>
             </a:fld>
             <a:endParaRPr lang="de-DE"/>
           </a:p>
@@ -1786,7 +1895,7 @@
           <a:p>
             <a:fld id="{DAD4AEBD-E175-AE42-B084-2E4026DB8423}" type="datetimeFigureOut">
               <a:rPr lang="de-DE" smtClean="0"/>
-              <a:t>09.04.2025</a:t>
+              <a:t>14.04.2025</a:t>
             </a:fld>
             <a:endParaRPr lang="de-DE"/>
           </a:p>
@@ -2071,7 +2180,7 @@
           <a:p>
             <a:fld id="{DAD4AEBD-E175-AE42-B084-2E4026DB8423}" type="datetimeFigureOut">
               <a:rPr lang="de-DE" smtClean="0"/>
-              <a:t>09.04.2025</a:t>
+              <a:t>14.04.2025</a:t>
             </a:fld>
             <a:endParaRPr lang="de-DE"/>
           </a:p>
@@ -2490,7 +2599,7 @@
           <a:p>
             <a:fld id="{DAD4AEBD-E175-AE42-B084-2E4026DB8423}" type="datetimeFigureOut">
               <a:rPr lang="de-DE" smtClean="0"/>
-              <a:t>09.04.2025</a:t>
+              <a:t>14.04.2025</a:t>
             </a:fld>
             <a:endParaRPr lang="de-DE"/>
           </a:p>
@@ -2607,7 +2716,7 @@
           <a:p>
             <a:fld id="{DAD4AEBD-E175-AE42-B084-2E4026DB8423}" type="datetimeFigureOut">
               <a:rPr lang="de-DE" smtClean="0"/>
-              <a:t>09.04.2025</a:t>
+              <a:t>14.04.2025</a:t>
             </a:fld>
             <a:endParaRPr lang="de-DE"/>
           </a:p>
@@ -2702,7 +2811,7 @@
           <a:p>
             <a:fld id="{DAD4AEBD-E175-AE42-B084-2E4026DB8423}" type="datetimeFigureOut">
               <a:rPr lang="de-DE" smtClean="0"/>
-              <a:t>09.04.2025</a:t>
+              <a:t>14.04.2025</a:t>
             </a:fld>
             <a:endParaRPr lang="de-DE"/>
           </a:p>
@@ -2977,7 +3086,7 @@
           <a:p>
             <a:fld id="{DAD4AEBD-E175-AE42-B084-2E4026DB8423}" type="datetimeFigureOut">
               <a:rPr lang="de-DE" smtClean="0"/>
-              <a:t>09.04.2025</a:t>
+              <a:t>14.04.2025</a:t>
             </a:fld>
             <a:endParaRPr lang="de-DE"/>
           </a:p>
@@ -3229,7 +3338,7 @@
           <a:p>
             <a:fld id="{DAD4AEBD-E175-AE42-B084-2E4026DB8423}" type="datetimeFigureOut">
               <a:rPr lang="de-DE" smtClean="0"/>
-              <a:t>09.04.2025</a:t>
+              <a:t>14.04.2025</a:t>
             </a:fld>
             <a:endParaRPr lang="de-DE"/>
           </a:p>
@@ -3440,7 +3549,7 @@
           <a:p>
             <a:fld id="{DAD4AEBD-E175-AE42-B084-2E4026DB8423}" type="datetimeFigureOut">
               <a:rPr lang="de-DE" smtClean="0"/>
-              <a:t>09.04.2025</a:t>
+              <a:t>14.04.2025</a:t>
             </a:fld>
             <a:endParaRPr lang="de-DE"/>
           </a:p>
@@ -6032,6 +6141,57 @@
       </p:grpSpPr>
       <p:sp>
         <p:nvSpPr>
+          <p:cNvPr id="2" name="Rectangle 1">
+            <a:extLst>
+              <a:ext uri="{FF2B5EF4-FFF2-40B4-BE49-F238E27FC236}">
+                <a16:creationId xmlns:a16="http://schemas.microsoft.com/office/drawing/2014/main" id="{C28EF4FB-7041-8297-97FE-A9C583E7B500}"/>
+              </a:ext>
+            </a:extLst>
+          </p:cNvPr>
+          <p:cNvSpPr/>
+          <p:nvPr/>
+        </p:nvSpPr>
+        <p:spPr>
+          <a:xfrm>
+            <a:off x="8856924" y="257577"/>
+            <a:ext cx="2163098" cy="5997261"/>
+          </a:xfrm>
+          <a:prstGeom prst="rect">
+            <a:avLst/>
+          </a:prstGeom>
+          <a:solidFill>
+            <a:schemeClr val="bg1"/>
+          </a:solidFill>
+          <a:ln>
+            <a:noFill/>
+          </a:ln>
+          <a:effectLst/>
+        </p:spPr>
+        <p:style>
+          <a:lnRef idx="1">
+            <a:schemeClr val="accent1"/>
+          </a:lnRef>
+          <a:fillRef idx="3">
+            <a:schemeClr val="accent1"/>
+          </a:fillRef>
+          <a:effectRef idx="2">
+            <a:schemeClr val="accent1"/>
+          </a:effectRef>
+          <a:fontRef idx="minor">
+            <a:schemeClr val="lt1"/>
+          </a:fontRef>
+        </p:style>
+        <p:txBody>
+          <a:bodyPr rtlCol="0" anchor="ctr"/>
+          <a:lstStyle/>
+          <a:p>
+            <a:pPr algn="ctr"/>
+            <a:endParaRPr lang="LID4096"/>
+          </a:p>
+        </p:txBody>
+      </p:sp>
+      <p:sp>
+        <p:nvSpPr>
           <p:cNvPr id="12" name="Rectangle 11">
             <a:extLst>
               <a:ext uri="{FF2B5EF4-FFF2-40B4-BE49-F238E27FC236}">
@@ -6044,7 +6204,7 @@
         </p:nvSpPr>
         <p:spPr>
           <a:xfrm>
-            <a:off x="181855" y="665168"/>
+            <a:off x="1100557" y="667502"/>
             <a:ext cx="2232000" cy="647157"/>
           </a:xfrm>
           <a:prstGeom prst="rect">
@@ -6120,7 +6280,7 @@
         </p:nvSpPr>
         <p:spPr>
           <a:xfrm>
-            <a:off x="3456000" y="665168"/>
+            <a:off x="4374702" y="667502"/>
             <a:ext cx="2232000" cy="647157"/>
           </a:xfrm>
           <a:prstGeom prst="rect">
@@ -6170,7 +6330,7 @@
                 <a:latin typeface="Verdana" panose="020B0604030504040204" pitchFamily="34" charset="0"/>
                 <a:ea typeface="Verdana" panose="020B0604030504040204" pitchFamily="34" charset="0"/>
               </a:rPr>
-              <a:t>Mother of Fetus</a:t>
+              <a:t>Mother of Child</a:t>
             </a:r>
             <a:endParaRPr lang="en-US" sz="899" kern="0" dirty="0">
               <a:solidFill>
@@ -6196,7 +6356,7 @@
         </p:nvSpPr>
         <p:spPr>
           <a:xfrm>
-            <a:off x="2468655" y="662834"/>
+            <a:off x="3387357" y="665168"/>
             <a:ext cx="932544" cy="323579"/>
           </a:xfrm>
           <a:prstGeom prst="rect">
@@ -6250,7 +6410,7 @@
         </p:nvCxnSpPr>
         <p:spPr>
           <a:xfrm>
-            <a:off x="2413855" y="988747"/>
+            <a:off x="3332557" y="991081"/>
             <a:ext cx="1042145" cy="0"/>
           </a:xfrm>
           <a:prstGeom prst="straightConnector1">
@@ -6292,7 +6452,7 @@
         </p:nvSpPr>
         <p:spPr>
           <a:xfrm>
-            <a:off x="6730145" y="665168"/>
+            <a:off x="7648847" y="667502"/>
             <a:ext cx="2232000" cy="647157"/>
           </a:xfrm>
           <a:prstGeom prst="rect">
@@ -6342,7 +6502,7 @@
                 <a:latin typeface="Verdana" panose="020B0604030504040204" pitchFamily="34" charset="0"/>
                 <a:ea typeface="Verdana" panose="020B0604030504040204" pitchFamily="34" charset="0"/>
               </a:rPr>
-              <a:t>Fetus</a:t>
+              <a:t>Child</a:t>
             </a:r>
             <a:endParaRPr lang="en-US" sz="899" kern="0" dirty="0">
               <a:solidFill>
@@ -6372,7 +6532,7 @@
         </p:nvCxnSpPr>
         <p:spPr>
           <a:xfrm>
-            <a:off x="5688000" y="988747"/>
+            <a:off x="6606702" y="991081"/>
             <a:ext cx="1042145" cy="0"/>
           </a:xfrm>
           <a:prstGeom prst="straightConnector1">
@@ -6414,7 +6574,7 @@
         </p:nvSpPr>
         <p:spPr>
           <a:xfrm>
-            <a:off x="5742800" y="662835"/>
+            <a:off x="6661502" y="665169"/>
             <a:ext cx="932544" cy="323579"/>
           </a:xfrm>
           <a:prstGeom prst="rect">
@@ -6452,10 +6612,10 @@
       </p:sp>
       <p:sp>
         <p:nvSpPr>
-          <p:cNvPr id="20" name="Rectangle 19">
+          <p:cNvPr id="49" name="Rectangle 48">
             <a:extLst>
               <a:ext uri="{FF2B5EF4-FFF2-40B4-BE49-F238E27FC236}">
-                <a16:creationId xmlns:a16="http://schemas.microsoft.com/office/drawing/2014/main" id="{5AEC2A9F-539A-ED0D-1AA8-8676FB03B06F}"/>
+                <a16:creationId xmlns:a16="http://schemas.microsoft.com/office/drawing/2014/main" id="{FCB500B3-D7D9-60D6-9003-10D2A1E52362}"/>
               </a:ext>
             </a:extLst>
           </p:cNvPr>
@@ -6464,249 +6624,7 @@
         </p:nvSpPr>
         <p:spPr>
           <a:xfrm>
-            <a:off x="6730145" y="1964272"/>
-            <a:ext cx="2232000" cy="647157"/>
-          </a:xfrm>
-          <a:prstGeom prst="rect">
-            <a:avLst/>
-          </a:prstGeom>
-          <a:noFill/>
-          <a:ln w="19050" cap="flat" cmpd="sng" algn="ctr">
-            <a:solidFill>
-              <a:srgbClr val="F79646"/>
-            </a:solidFill>
-            <a:prstDash val="solid"/>
-            <a:miter lim="800000"/>
-          </a:ln>
-          <a:effectLst/>
-        </p:spPr>
-        <p:txBody>
-          <a:bodyPr rtlCol="0" anchor="ctr"/>
-          <a:lstStyle/>
-          <a:p>
-            <a:pPr algn="ctr" defTabSz="684886">
-              <a:defRPr/>
-            </a:pPr>
-            <a:r>
-              <a:rPr lang="en-US" sz="1198" kern="0" dirty="0">
-                <a:solidFill>
-                  <a:prstClr val="black"/>
-                </a:solidFill>
-                <a:latin typeface="Verdana" panose="020B0604030504040204" pitchFamily="34" charset="0"/>
-                <a:ea typeface="Verdana" panose="020B0604030504040204" pitchFamily="34" charset="0"/>
-              </a:rPr>
-              <a:t>CH EPREG Observation: Fetal Position</a:t>
-            </a:r>
-          </a:p>
-        </p:txBody>
-      </p:sp>
-      <p:sp>
-        <p:nvSpPr>
-          <p:cNvPr id="21" name="Rectangle 20">
-            <a:extLst>
-              <a:ext uri="{FF2B5EF4-FFF2-40B4-BE49-F238E27FC236}">
-                <a16:creationId xmlns:a16="http://schemas.microsoft.com/office/drawing/2014/main" id="{E8769307-FCB4-77A6-0E8D-484AC13B034F}"/>
-              </a:ext>
-            </a:extLst>
-          </p:cNvPr>
-          <p:cNvSpPr/>
-          <p:nvPr/>
-        </p:nvSpPr>
-        <p:spPr>
-          <a:xfrm>
-            <a:off x="7005678" y="1476509"/>
-            <a:ext cx="932544" cy="323579"/>
-          </a:xfrm>
-          <a:prstGeom prst="rect">
-            <a:avLst/>
-          </a:prstGeom>
-          <a:noFill/>
-          <a:ln w="12700" cap="flat" cmpd="sng" algn="ctr">
-            <a:noFill/>
-            <a:prstDash val="solid"/>
-            <a:miter lim="800000"/>
-          </a:ln>
-          <a:effectLst/>
-        </p:spPr>
-        <p:txBody>
-          <a:bodyPr rtlCol="0" anchor="ctr"/>
-          <a:lstStyle/>
-          <a:p>
-            <a:pPr algn="ctr" defTabSz="684886">
-              <a:defRPr/>
-            </a:pPr>
-            <a:r>
-              <a:rPr lang="en-US" sz="1198" kern="0" dirty="0">
-                <a:solidFill>
-                  <a:schemeClr val="bg1">
-                    <a:lumMod val="50000"/>
-                  </a:schemeClr>
-                </a:solidFill>
-                <a:latin typeface="Verdana" panose="020B0604030504040204" pitchFamily="34" charset="0"/>
-                <a:ea typeface="Verdana" panose="020B0604030504040204" pitchFamily="34" charset="0"/>
-              </a:rPr>
-              <a:t>subject</a:t>
-            </a:r>
-          </a:p>
-        </p:txBody>
-      </p:sp>
-      <p:cxnSp>
-        <p:nvCxnSpPr>
-          <p:cNvPr id="23" name="Straight Arrow Connector 22">
-            <a:extLst>
-              <a:ext uri="{FF2B5EF4-FFF2-40B4-BE49-F238E27FC236}">
-                <a16:creationId xmlns:a16="http://schemas.microsoft.com/office/drawing/2014/main" id="{1AB411BF-75A4-6F8C-8D98-A0A6F9C6021E}"/>
-              </a:ext>
-            </a:extLst>
-          </p:cNvPr>
-          <p:cNvCxnSpPr>
-            <a:cxnSpLocks/>
-            <a:stCxn id="28" idx="0"/>
-            <a:endCxn id="12" idx="2"/>
-          </p:cNvCxnSpPr>
-          <p:nvPr/>
-        </p:nvCxnSpPr>
-        <p:spPr>
-          <a:xfrm flipV="1">
-            <a:off x="1297855" y="1312325"/>
-            <a:ext cx="0" cy="651948"/>
-          </a:xfrm>
-          <a:prstGeom prst="straightConnector1">
-            <a:avLst/>
-          </a:prstGeom>
-          <a:ln w="19050">
-            <a:solidFill>
-              <a:srgbClr val="B6B6B6"/>
-            </a:solidFill>
-            <a:tailEnd type="triangle"/>
-          </a:ln>
-        </p:spPr>
-        <p:style>
-          <a:lnRef idx="1">
-            <a:schemeClr val="accent1"/>
-          </a:lnRef>
-          <a:fillRef idx="0">
-            <a:schemeClr val="accent1"/>
-          </a:fillRef>
-          <a:effectRef idx="0">
-            <a:schemeClr val="accent1"/>
-          </a:effectRef>
-          <a:fontRef idx="minor">
-            <a:schemeClr val="tx1"/>
-          </a:fontRef>
-        </p:style>
-      </p:cxnSp>
-      <p:sp>
-        <p:nvSpPr>
-          <p:cNvPr id="24" name="Rectangle 23">
-            <a:extLst>
-              <a:ext uri="{FF2B5EF4-FFF2-40B4-BE49-F238E27FC236}">
-                <a16:creationId xmlns:a16="http://schemas.microsoft.com/office/drawing/2014/main" id="{255FE7A0-7311-ADCB-3410-C40E888C7FF7}"/>
-              </a:ext>
-            </a:extLst>
-          </p:cNvPr>
-          <p:cNvSpPr/>
-          <p:nvPr/>
-        </p:nvSpPr>
-        <p:spPr>
-          <a:xfrm>
-            <a:off x="1223107" y="1476509"/>
-            <a:ext cx="932544" cy="323579"/>
-          </a:xfrm>
-          <a:prstGeom prst="rect">
-            <a:avLst/>
-          </a:prstGeom>
-          <a:noFill/>
-          <a:ln w="12700" cap="flat" cmpd="sng" algn="ctr">
-            <a:noFill/>
-            <a:prstDash val="solid"/>
-            <a:miter lim="800000"/>
-          </a:ln>
-          <a:effectLst/>
-        </p:spPr>
-        <p:txBody>
-          <a:bodyPr rtlCol="0" anchor="ctr"/>
-          <a:lstStyle/>
-          <a:p>
-            <a:pPr algn="ctr" defTabSz="684886">
-              <a:defRPr/>
-            </a:pPr>
-            <a:r>
-              <a:rPr lang="en-US" sz="1198" kern="0" dirty="0">
-                <a:solidFill>
-                  <a:schemeClr val="bg1">
-                    <a:lumMod val="50000"/>
-                  </a:schemeClr>
-                </a:solidFill>
-                <a:latin typeface="Verdana" panose="020B0604030504040204" pitchFamily="34" charset="0"/>
-                <a:ea typeface="Verdana" panose="020B0604030504040204" pitchFamily="34" charset="0"/>
-              </a:rPr>
-              <a:t>subject</a:t>
-            </a:r>
-          </a:p>
-        </p:txBody>
-      </p:sp>
-      <p:cxnSp>
-        <p:nvCxnSpPr>
-          <p:cNvPr id="25" name="Straight Arrow Connector 24">
-            <a:extLst>
-              <a:ext uri="{FF2B5EF4-FFF2-40B4-BE49-F238E27FC236}">
-                <a16:creationId xmlns:a16="http://schemas.microsoft.com/office/drawing/2014/main" id="{A1F3E05A-D2C6-8491-48AC-61A10631EB52}"/>
-              </a:ext>
-            </a:extLst>
-          </p:cNvPr>
-          <p:cNvCxnSpPr>
-            <a:cxnSpLocks/>
-            <a:stCxn id="20" idx="0"/>
-            <a:endCxn id="8" idx="2"/>
-          </p:cNvCxnSpPr>
-          <p:nvPr/>
-        </p:nvCxnSpPr>
-        <p:spPr>
-          <a:xfrm flipV="1">
-            <a:off x="7846145" y="1312325"/>
-            <a:ext cx="0" cy="651947"/>
-          </a:xfrm>
-          <a:prstGeom prst="straightConnector1">
-            <a:avLst/>
-          </a:prstGeom>
-          <a:ln w="19050">
-            <a:solidFill>
-              <a:srgbClr val="B6B6B6"/>
-            </a:solidFill>
-            <a:tailEnd type="triangle"/>
-          </a:ln>
-        </p:spPr>
-        <p:style>
-          <a:lnRef idx="1">
-            <a:schemeClr val="accent1"/>
-          </a:lnRef>
-          <a:fillRef idx="0">
-            <a:schemeClr val="accent1"/>
-          </a:fillRef>
-          <a:effectRef idx="0">
-            <a:schemeClr val="accent1"/>
-          </a:effectRef>
-          <a:fontRef idx="minor">
-            <a:schemeClr val="tx1"/>
-          </a:fontRef>
-        </p:style>
-      </p:cxnSp>
-      <p:sp>
-        <p:nvSpPr>
-          <p:cNvPr id="28" name="Rectangle 27">
-            <a:extLst>
-              <a:ext uri="{FF2B5EF4-FFF2-40B4-BE49-F238E27FC236}">
-                <a16:creationId xmlns:a16="http://schemas.microsoft.com/office/drawing/2014/main" id="{3808CA61-6564-7AA0-E3F0-F50B0565131E}"/>
-              </a:ext>
-            </a:extLst>
-          </p:cNvPr>
-          <p:cNvSpPr/>
-          <p:nvPr/>
-        </p:nvSpPr>
-        <p:spPr>
-          <a:xfrm>
-            <a:off x="181855" y="1964273"/>
+            <a:off x="1100557" y="4175915"/>
             <a:ext cx="2232000" cy="647157"/>
           </a:xfrm>
           <a:prstGeom prst="rect">
@@ -6737,82 +6655,6 @@
                 <a:latin typeface="Verdana" panose="020B0604030504040204" pitchFamily="34" charset="0"/>
                 <a:ea typeface="Verdana" panose="020B0604030504040204" pitchFamily="34" charset="0"/>
               </a:rPr>
-              <a:t>CH EPREG Observation:</a:t>
-            </a:r>
-            <a:br>
-              <a:rPr lang="en-US" sz="1198" kern="0" dirty="0">
-                <a:solidFill>
-                  <a:prstClr val="black"/>
-                </a:solidFill>
-                <a:latin typeface="Verdana" panose="020B0604030504040204" pitchFamily="34" charset="0"/>
-                <a:ea typeface="Verdana" panose="020B0604030504040204" pitchFamily="34" charset="0"/>
-              </a:rPr>
-            </a:br>
-            <a:r>
-              <a:rPr lang="en-US" sz="1198" kern="0" dirty="0">
-                <a:solidFill>
-                  <a:prstClr val="black"/>
-                </a:solidFill>
-                <a:latin typeface="Verdana" panose="020B0604030504040204" pitchFamily="34" charset="0"/>
-                <a:ea typeface="Verdana" panose="020B0604030504040204" pitchFamily="34" charset="0"/>
-              </a:rPr>
-              <a:t>Gestational Age</a:t>
-            </a:r>
-            <a:endParaRPr lang="en-US" sz="1348" kern="0" dirty="0">
-              <a:solidFill>
-                <a:prstClr val="black"/>
-              </a:solidFill>
-              <a:latin typeface="Verdana" panose="020B0604030504040204" pitchFamily="34" charset="0"/>
-              <a:ea typeface="Verdana" panose="020B0604030504040204" pitchFamily="34" charset="0"/>
-            </a:endParaRPr>
-          </a:p>
-        </p:txBody>
-      </p:sp>
-      <p:sp>
-        <p:nvSpPr>
-          <p:cNvPr id="49" name="Rectangle 48">
-            <a:extLst>
-              <a:ext uri="{FF2B5EF4-FFF2-40B4-BE49-F238E27FC236}">
-                <a16:creationId xmlns:a16="http://schemas.microsoft.com/office/drawing/2014/main" id="{FCB500B3-D7D9-60D6-9003-10D2A1E52362}"/>
-              </a:ext>
-            </a:extLst>
-          </p:cNvPr>
-          <p:cNvSpPr/>
-          <p:nvPr/>
-        </p:nvSpPr>
-        <p:spPr>
-          <a:xfrm>
-            <a:off x="181855" y="4173581"/>
-            <a:ext cx="2232000" cy="647157"/>
-          </a:xfrm>
-          <a:prstGeom prst="rect">
-            <a:avLst/>
-          </a:prstGeom>
-          <a:noFill/>
-          <a:ln w="19050" cap="flat" cmpd="sng" algn="ctr">
-            <a:solidFill>
-              <a:srgbClr val="C00000"/>
-            </a:solidFill>
-            <a:prstDash val="solid"/>
-            <a:miter lim="800000"/>
-          </a:ln>
-          <a:effectLst/>
-        </p:spPr>
-        <p:txBody>
-          <a:bodyPr rtlCol="0" anchor="ctr"/>
-          <a:lstStyle/>
-          <a:p>
-            <a:pPr algn="ctr" defTabSz="684886">
-              <a:defRPr/>
-            </a:pPr>
-            <a:r>
-              <a:rPr lang="en-US" sz="1198" kern="0" dirty="0">
-                <a:solidFill>
-                  <a:prstClr val="black"/>
-                </a:solidFill>
-                <a:latin typeface="Verdana" panose="020B0604030504040204" pitchFamily="34" charset="0"/>
-                <a:ea typeface="Verdana" panose="020B0604030504040204" pitchFamily="34" charset="0"/>
-              </a:rPr>
               <a:t>CH EPREG Patient:</a:t>
             </a:r>
             <a:br>
@@ -6858,7 +6700,7 @@
         </p:nvSpPr>
         <p:spPr>
           <a:xfrm>
-            <a:off x="3456000" y="3526424"/>
+            <a:off x="4374702" y="3528758"/>
             <a:ext cx="2232000" cy="647157"/>
           </a:xfrm>
           <a:prstGeom prst="rect">
@@ -6908,7 +6750,7 @@
                 <a:latin typeface="Verdana" panose="020B0604030504040204" pitchFamily="34" charset="0"/>
                 <a:ea typeface="Verdana" panose="020B0604030504040204" pitchFamily="34" charset="0"/>
               </a:rPr>
-              <a:t>Mother of Fetus A</a:t>
+              <a:t>Mother of Child A</a:t>
             </a:r>
             <a:endParaRPr lang="en-US" sz="899" kern="0" dirty="0">
               <a:solidFill>
@@ -6934,7 +6776,7 @@
         </p:nvSpPr>
         <p:spPr>
           <a:xfrm>
-            <a:off x="2468655" y="3635707"/>
+            <a:off x="3387357" y="3638041"/>
             <a:ext cx="932544" cy="323579"/>
           </a:xfrm>
           <a:prstGeom prst="rect">
@@ -6988,7 +6830,7 @@
         </p:nvCxnSpPr>
         <p:spPr>
           <a:xfrm flipV="1">
-            <a:off x="2413855" y="3850003"/>
+            <a:off x="3332557" y="3852337"/>
             <a:ext cx="1042145" cy="647157"/>
           </a:xfrm>
           <a:prstGeom prst="straightConnector1">
@@ -7030,7 +6872,7 @@
         </p:nvSpPr>
         <p:spPr>
           <a:xfrm>
-            <a:off x="6730145" y="3526424"/>
+            <a:off x="7648847" y="3528758"/>
             <a:ext cx="2232000" cy="647157"/>
           </a:xfrm>
           <a:prstGeom prst="rect">
@@ -7080,7 +6922,7 @@
                 <a:latin typeface="Verdana" panose="020B0604030504040204" pitchFamily="34" charset="0"/>
                 <a:ea typeface="Verdana" panose="020B0604030504040204" pitchFamily="34" charset="0"/>
               </a:rPr>
-              <a:t>Fetus B</a:t>
+              <a:t>Child B</a:t>
             </a:r>
             <a:endParaRPr lang="en-US" sz="899" kern="0" dirty="0">
               <a:solidFill>
@@ -7110,7 +6952,7 @@
         </p:nvCxnSpPr>
         <p:spPr>
           <a:xfrm>
-            <a:off x="5688000" y="3850003"/>
+            <a:off x="6606702" y="3852337"/>
             <a:ext cx="1042145" cy="0"/>
           </a:xfrm>
           <a:prstGeom prst="straightConnector1">
@@ -7152,7 +6994,7 @@
         </p:nvSpPr>
         <p:spPr>
           <a:xfrm>
-            <a:off x="5742800" y="3524091"/>
+            <a:off x="6661502" y="3526425"/>
             <a:ext cx="932544" cy="323579"/>
           </a:xfrm>
           <a:prstGeom prst="rect">
@@ -7202,7 +7044,7 @@
         </p:nvSpPr>
         <p:spPr>
           <a:xfrm>
-            <a:off x="3456000" y="4820738"/>
+            <a:off x="4374702" y="4823072"/>
             <a:ext cx="2232000" cy="647157"/>
           </a:xfrm>
           <a:prstGeom prst="rect">
@@ -7252,17 +7094,7 @@
                 <a:latin typeface="Verdana" panose="020B0604030504040204" pitchFamily="34" charset="0"/>
                 <a:ea typeface="Verdana" panose="020B0604030504040204" pitchFamily="34" charset="0"/>
               </a:rPr>
-              <a:t>Mother of </a:t>
-            </a:r>
-            <a:r>
-              <a:rPr lang="en-US" sz="1198" kern="0">
-                <a:solidFill>
-                  <a:prstClr val="black"/>
-                </a:solidFill>
-                <a:latin typeface="Verdana" panose="020B0604030504040204" pitchFamily="34" charset="0"/>
-                <a:ea typeface="Verdana" panose="020B0604030504040204" pitchFamily="34" charset="0"/>
-              </a:rPr>
-              <a:t>Fetus B</a:t>
+              <a:t>Mother of Child B</a:t>
             </a:r>
             <a:endParaRPr lang="en-US" sz="899" kern="0" dirty="0">
               <a:solidFill>
@@ -7292,7 +7124,7 @@
         </p:nvCxnSpPr>
         <p:spPr>
           <a:xfrm>
-            <a:off x="2413855" y="4497160"/>
+            <a:off x="3332557" y="4499494"/>
             <a:ext cx="1042145" cy="647157"/>
           </a:xfrm>
           <a:prstGeom prst="straightConnector1">
@@ -7334,7 +7166,7 @@
         </p:nvSpPr>
         <p:spPr>
           <a:xfrm>
-            <a:off x="2468655" y="5050237"/>
+            <a:off x="3387357" y="5052571"/>
             <a:ext cx="932544" cy="323579"/>
           </a:xfrm>
           <a:prstGeom prst="rect">
@@ -7384,7 +7216,7 @@
         </p:nvSpPr>
         <p:spPr>
           <a:xfrm>
-            <a:off x="6730145" y="4820738"/>
+            <a:off x="7648847" y="4823072"/>
             <a:ext cx="2232000" cy="647157"/>
           </a:xfrm>
           <a:prstGeom prst="rect">
@@ -7434,7 +7266,7 @@
                 <a:latin typeface="Verdana" panose="020B0604030504040204" pitchFamily="34" charset="0"/>
                 <a:ea typeface="Verdana" panose="020B0604030504040204" pitchFamily="34" charset="0"/>
               </a:rPr>
-              <a:t>Fetus B</a:t>
+              <a:t>Child B</a:t>
             </a:r>
             <a:endParaRPr lang="en-US" sz="899" kern="0" dirty="0">
               <a:solidFill>
@@ -7462,7 +7294,7 @@
         </p:nvCxnSpPr>
         <p:spPr>
           <a:xfrm>
-            <a:off x="5688000" y="5146650"/>
+            <a:off x="6606702" y="5148984"/>
             <a:ext cx="1042145" cy="0"/>
           </a:xfrm>
           <a:prstGeom prst="straightConnector1">
@@ -7504,7 +7336,7 @@
         </p:nvSpPr>
         <p:spPr>
           <a:xfrm>
-            <a:off x="5742800" y="4820738"/>
+            <a:off x="6661502" y="4823072"/>
             <a:ext cx="932544" cy="323579"/>
           </a:xfrm>
           <a:prstGeom prst="rect">
@@ -7544,6 +7376,1439 @@
     <p:extLst>
       <p:ext uri="{BB962C8B-B14F-4D97-AF65-F5344CB8AC3E}">
         <p14:creationId xmlns:p14="http://schemas.microsoft.com/office/powerpoint/2010/main" val="1804212381"/>
+      </p:ext>
+    </p:extLst>
+  </p:cSld>
+  <p:clrMapOvr>
+    <a:masterClrMapping/>
+  </p:clrMapOvr>
+</p:sld>
+</file>
+
+<file path=ppt/slides/slide3.xml><?xml version="1.0" encoding="utf-8"?>
+<p:sld xmlns:a="http://schemas.openxmlformats.org/drawingml/2006/main" xmlns:r="http://schemas.openxmlformats.org/officeDocument/2006/relationships" xmlns:p="http://schemas.openxmlformats.org/presentationml/2006/main">
+  <p:cSld>
+    <p:spTree>
+      <p:nvGrpSpPr>
+        <p:cNvPr id="1" name="">
+          <a:extLst>
+            <a:ext uri="{FF2B5EF4-FFF2-40B4-BE49-F238E27FC236}">
+              <a16:creationId xmlns:a16="http://schemas.microsoft.com/office/drawing/2014/main" id="{FDB9C766-233A-ACC7-5D41-A191F99557A9}"/>
+            </a:ext>
+          </a:extLst>
+        </p:cNvPr>
+        <p:cNvGrpSpPr/>
+        <p:nvPr/>
+      </p:nvGrpSpPr>
+      <p:grpSpPr>
+        <a:xfrm>
+          <a:off x="0" y="0"/>
+          <a:ext cx="0" cy="0"/>
+          <a:chOff x="0" y="0"/>
+          <a:chExt cx="0" cy="0"/>
+        </a:xfrm>
+      </p:grpSpPr>
+      <p:sp>
+        <p:nvSpPr>
+          <p:cNvPr id="26" name="Rectangle 25">
+            <a:extLst>
+              <a:ext uri="{FF2B5EF4-FFF2-40B4-BE49-F238E27FC236}">
+                <a16:creationId xmlns:a16="http://schemas.microsoft.com/office/drawing/2014/main" id="{A729AD63-8AE8-D73F-B1E1-CC93C6500C29}"/>
+              </a:ext>
+            </a:extLst>
+          </p:cNvPr>
+          <p:cNvSpPr/>
+          <p:nvPr/>
+        </p:nvSpPr>
+        <p:spPr>
+          <a:xfrm>
+            <a:off x="8856924" y="257577"/>
+            <a:ext cx="2163098" cy="4159877"/>
+          </a:xfrm>
+          <a:prstGeom prst="rect">
+            <a:avLst/>
+          </a:prstGeom>
+          <a:solidFill>
+            <a:schemeClr val="bg1"/>
+          </a:solidFill>
+          <a:ln>
+            <a:noFill/>
+          </a:ln>
+          <a:effectLst/>
+        </p:spPr>
+        <p:style>
+          <a:lnRef idx="1">
+            <a:schemeClr val="accent1"/>
+          </a:lnRef>
+          <a:fillRef idx="3">
+            <a:schemeClr val="accent1"/>
+          </a:fillRef>
+          <a:effectRef idx="2">
+            <a:schemeClr val="accent1"/>
+          </a:effectRef>
+          <a:fontRef idx="minor">
+            <a:schemeClr val="lt1"/>
+          </a:fontRef>
+        </p:style>
+        <p:txBody>
+          <a:bodyPr rtlCol="0" anchor="ctr"/>
+          <a:lstStyle/>
+          <a:p>
+            <a:pPr algn="ctr"/>
+            <a:endParaRPr lang="LID4096"/>
+          </a:p>
+        </p:txBody>
+      </p:sp>
+      <p:sp>
+        <p:nvSpPr>
+          <p:cNvPr id="12" name="Rectangle 11">
+            <a:extLst>
+              <a:ext uri="{FF2B5EF4-FFF2-40B4-BE49-F238E27FC236}">
+                <a16:creationId xmlns:a16="http://schemas.microsoft.com/office/drawing/2014/main" id="{902F7985-C0A9-5AA8-AE6F-A5B329460609}"/>
+              </a:ext>
+            </a:extLst>
+          </p:cNvPr>
+          <p:cNvSpPr/>
+          <p:nvPr/>
+        </p:nvSpPr>
+        <p:spPr>
+          <a:xfrm>
+            <a:off x="1100557" y="665168"/>
+            <a:ext cx="2232000" cy="647157"/>
+          </a:xfrm>
+          <a:prstGeom prst="rect">
+            <a:avLst/>
+          </a:prstGeom>
+          <a:noFill/>
+          <a:ln w="19050" cap="flat" cmpd="sng" algn="ctr">
+            <a:solidFill>
+              <a:srgbClr val="C00000"/>
+            </a:solidFill>
+            <a:prstDash val="solid"/>
+            <a:miter lim="800000"/>
+          </a:ln>
+          <a:effectLst/>
+        </p:spPr>
+        <p:txBody>
+          <a:bodyPr rtlCol="0" anchor="ctr"/>
+          <a:lstStyle/>
+          <a:p>
+            <a:pPr algn="ctr" defTabSz="684886">
+              <a:defRPr/>
+            </a:pPr>
+            <a:r>
+              <a:rPr lang="en-US" sz="1198" kern="0" dirty="0">
+                <a:solidFill>
+                  <a:prstClr val="black"/>
+                </a:solidFill>
+                <a:latin typeface="Verdana" panose="020B0604030504040204" pitchFamily="34" charset="0"/>
+                <a:ea typeface="Verdana" panose="020B0604030504040204" pitchFamily="34" charset="0"/>
+              </a:rPr>
+              <a:t>CH EPREG Patient:</a:t>
+            </a:r>
+            <a:br>
+              <a:rPr lang="en-US" sz="1198" kern="0" dirty="0">
+                <a:solidFill>
+                  <a:prstClr val="black"/>
+                </a:solidFill>
+                <a:latin typeface="Verdana" panose="020B0604030504040204" pitchFamily="34" charset="0"/>
+                <a:ea typeface="Verdana" panose="020B0604030504040204" pitchFamily="34" charset="0"/>
+              </a:rPr>
+            </a:br>
+            <a:r>
+              <a:rPr lang="en-US" sz="1198" kern="0" dirty="0">
+                <a:solidFill>
+                  <a:prstClr val="black"/>
+                </a:solidFill>
+                <a:latin typeface="Verdana" panose="020B0604030504040204" pitchFamily="34" charset="0"/>
+                <a:ea typeface="Verdana" panose="020B0604030504040204" pitchFamily="34" charset="0"/>
+              </a:rPr>
+              <a:t>Mother</a:t>
+            </a:r>
+            <a:endParaRPr lang="en-US" sz="1348" kern="0" dirty="0">
+              <a:solidFill>
+                <a:prstClr val="black"/>
+              </a:solidFill>
+              <a:latin typeface="Verdana" panose="020B0604030504040204" pitchFamily="34" charset="0"/>
+              <a:ea typeface="Verdana" panose="020B0604030504040204" pitchFamily="34" charset="0"/>
+            </a:endParaRPr>
+          </a:p>
+        </p:txBody>
+      </p:sp>
+      <p:sp>
+        <p:nvSpPr>
+          <p:cNvPr id="13" name="Rectangle 12">
+            <a:extLst>
+              <a:ext uri="{FF2B5EF4-FFF2-40B4-BE49-F238E27FC236}">
+                <a16:creationId xmlns:a16="http://schemas.microsoft.com/office/drawing/2014/main" id="{22575777-6A0F-A185-3417-48FBA1F1F0A5}"/>
+              </a:ext>
+            </a:extLst>
+          </p:cNvPr>
+          <p:cNvSpPr/>
+          <p:nvPr/>
+        </p:nvSpPr>
+        <p:spPr>
+          <a:xfrm>
+            <a:off x="4374702" y="665168"/>
+            <a:ext cx="2232000" cy="647157"/>
+          </a:xfrm>
+          <a:prstGeom prst="rect">
+            <a:avLst/>
+          </a:prstGeom>
+          <a:noFill/>
+          <a:ln w="19050" cap="flat" cmpd="sng" algn="ctr">
+            <a:solidFill>
+              <a:srgbClr val="A72931"/>
+            </a:solidFill>
+            <a:prstDash val="solid"/>
+            <a:miter lim="800000"/>
+          </a:ln>
+          <a:effectLst/>
+        </p:spPr>
+        <p:txBody>
+          <a:bodyPr rtlCol="0" anchor="ctr"/>
+          <a:lstStyle/>
+          <a:p>
+            <a:pPr algn="ctr" defTabSz="684886">
+              <a:defRPr/>
+            </a:pPr>
+            <a:r>
+              <a:rPr lang="en-US" sz="1198" kern="0" dirty="0">
+                <a:solidFill>
+                  <a:prstClr val="black"/>
+                </a:solidFill>
+                <a:latin typeface="Verdana" panose="020B0604030504040204" pitchFamily="34" charset="0"/>
+                <a:ea typeface="Verdana" panose="020B0604030504040204" pitchFamily="34" charset="0"/>
+              </a:rPr>
+              <a:t>CH EPREG RelatedPerson:</a:t>
+            </a:r>
+            <a:br>
+              <a:rPr lang="en-US" sz="1198" kern="0" dirty="0">
+                <a:solidFill>
+                  <a:prstClr val="black"/>
+                </a:solidFill>
+                <a:latin typeface="Verdana" panose="020B0604030504040204" pitchFamily="34" charset="0"/>
+                <a:ea typeface="Verdana" panose="020B0604030504040204" pitchFamily="34" charset="0"/>
+              </a:rPr>
+            </a:br>
+            <a:r>
+              <a:rPr lang="en-US" sz="1198" kern="0" dirty="0">
+                <a:solidFill>
+                  <a:prstClr val="black"/>
+                </a:solidFill>
+                <a:latin typeface="Verdana" panose="020B0604030504040204" pitchFamily="34" charset="0"/>
+                <a:ea typeface="Verdana" panose="020B0604030504040204" pitchFamily="34" charset="0"/>
+              </a:rPr>
+              <a:t>Mother of Child</a:t>
+            </a:r>
+            <a:endParaRPr lang="en-US" sz="899" kern="0" dirty="0">
+              <a:solidFill>
+                <a:prstClr val="black"/>
+              </a:solidFill>
+              <a:latin typeface="Verdana" panose="020B0604030504040204" pitchFamily="34" charset="0"/>
+              <a:ea typeface="Verdana" panose="020B0604030504040204" pitchFamily="34" charset="0"/>
+            </a:endParaRPr>
+          </a:p>
+        </p:txBody>
+      </p:sp>
+      <p:sp>
+        <p:nvSpPr>
+          <p:cNvPr id="18" name="Rectangle 17">
+            <a:extLst>
+              <a:ext uri="{FF2B5EF4-FFF2-40B4-BE49-F238E27FC236}">
+                <a16:creationId xmlns:a16="http://schemas.microsoft.com/office/drawing/2014/main" id="{681A2440-42CE-926C-8C8F-52723EA36FE9}"/>
+              </a:ext>
+            </a:extLst>
+          </p:cNvPr>
+          <p:cNvSpPr/>
+          <p:nvPr/>
+        </p:nvSpPr>
+        <p:spPr>
+          <a:xfrm>
+            <a:off x="3387357" y="662834"/>
+            <a:ext cx="932544" cy="323579"/>
+          </a:xfrm>
+          <a:prstGeom prst="rect">
+            <a:avLst/>
+          </a:prstGeom>
+          <a:noFill/>
+          <a:ln w="12700" cap="flat" cmpd="sng" algn="ctr">
+            <a:noFill/>
+            <a:prstDash val="solid"/>
+            <a:miter lim="800000"/>
+          </a:ln>
+          <a:effectLst/>
+        </p:spPr>
+        <p:txBody>
+          <a:bodyPr rtlCol="0" anchor="ctr"/>
+          <a:lstStyle/>
+          <a:p>
+            <a:pPr algn="ctr" defTabSz="684886">
+              <a:defRPr/>
+            </a:pPr>
+            <a:r>
+              <a:rPr lang="en-US" sz="1198" kern="0" dirty="0">
+                <a:solidFill>
+                  <a:schemeClr val="bg1">
+                    <a:lumMod val="50000"/>
+                  </a:schemeClr>
+                </a:solidFill>
+                <a:latin typeface="Verdana" panose="020B0604030504040204" pitchFamily="34" charset="0"/>
+                <a:ea typeface="Verdana" panose="020B0604030504040204" pitchFamily="34" charset="0"/>
+              </a:rPr>
+              <a:t>link.other</a:t>
+            </a:r>
+          </a:p>
+        </p:txBody>
+      </p:sp>
+      <p:cxnSp>
+        <p:nvCxnSpPr>
+          <p:cNvPr id="33" name="Straight Arrow Connector 32">
+            <a:extLst>
+              <a:ext uri="{FF2B5EF4-FFF2-40B4-BE49-F238E27FC236}">
+                <a16:creationId xmlns:a16="http://schemas.microsoft.com/office/drawing/2014/main" id="{35961D1A-2729-39C2-F2C5-29796ADBE480}"/>
+              </a:ext>
+            </a:extLst>
+          </p:cNvPr>
+          <p:cNvCxnSpPr>
+            <a:cxnSpLocks/>
+            <a:stCxn id="12" idx="3"/>
+            <a:endCxn id="13" idx="1"/>
+          </p:cNvCxnSpPr>
+          <p:nvPr/>
+        </p:nvCxnSpPr>
+        <p:spPr>
+          <a:xfrm>
+            <a:off x="3332557" y="988747"/>
+            <a:ext cx="1042145" cy="0"/>
+          </a:xfrm>
+          <a:prstGeom prst="straightConnector1">
+            <a:avLst/>
+          </a:prstGeom>
+          <a:ln w="19050">
+            <a:solidFill>
+              <a:srgbClr val="B6B6B6"/>
+            </a:solidFill>
+            <a:tailEnd type="triangle"/>
+          </a:ln>
+        </p:spPr>
+        <p:style>
+          <a:lnRef idx="1">
+            <a:schemeClr val="accent1"/>
+          </a:lnRef>
+          <a:fillRef idx="0">
+            <a:schemeClr val="accent1"/>
+          </a:fillRef>
+          <a:effectRef idx="0">
+            <a:schemeClr val="accent1"/>
+          </a:effectRef>
+          <a:fontRef idx="minor">
+            <a:schemeClr val="tx1"/>
+          </a:fontRef>
+        </p:style>
+      </p:cxnSp>
+      <p:sp>
+        <p:nvSpPr>
+          <p:cNvPr id="8" name="Rectangle 7">
+            <a:extLst>
+              <a:ext uri="{FF2B5EF4-FFF2-40B4-BE49-F238E27FC236}">
+                <a16:creationId xmlns:a16="http://schemas.microsoft.com/office/drawing/2014/main" id="{92500994-F2A9-1577-69F3-8D534C6950FD}"/>
+              </a:ext>
+            </a:extLst>
+          </p:cNvPr>
+          <p:cNvSpPr/>
+          <p:nvPr/>
+        </p:nvSpPr>
+        <p:spPr>
+          <a:xfrm>
+            <a:off x="7648847" y="665168"/>
+            <a:ext cx="2232000" cy="647157"/>
+          </a:xfrm>
+          <a:prstGeom prst="rect">
+            <a:avLst/>
+          </a:prstGeom>
+          <a:noFill/>
+          <a:ln w="19050" cap="flat" cmpd="sng" algn="ctr">
+            <a:solidFill>
+              <a:srgbClr val="F79646"/>
+            </a:solidFill>
+            <a:prstDash val="solid"/>
+            <a:miter lim="800000"/>
+          </a:ln>
+          <a:effectLst/>
+        </p:spPr>
+        <p:txBody>
+          <a:bodyPr rtlCol="0" anchor="ctr"/>
+          <a:lstStyle/>
+          <a:p>
+            <a:pPr algn="ctr" defTabSz="684886">
+              <a:defRPr/>
+            </a:pPr>
+            <a:r>
+              <a:rPr lang="en-US" sz="1198" kern="0" dirty="0">
+                <a:solidFill>
+                  <a:prstClr val="black"/>
+                </a:solidFill>
+                <a:latin typeface="Verdana" panose="020B0604030504040204" pitchFamily="34" charset="0"/>
+                <a:ea typeface="Verdana" panose="020B0604030504040204" pitchFamily="34" charset="0"/>
+              </a:rPr>
+              <a:t>CH EPREG Patient:</a:t>
+            </a:r>
+            <a:br>
+              <a:rPr lang="en-US" sz="1198" kern="0" dirty="0">
+                <a:solidFill>
+                  <a:prstClr val="black"/>
+                </a:solidFill>
+                <a:latin typeface="Verdana" panose="020B0604030504040204" pitchFamily="34" charset="0"/>
+                <a:ea typeface="Verdana" panose="020B0604030504040204" pitchFamily="34" charset="0"/>
+              </a:rPr>
+            </a:br>
+            <a:r>
+              <a:rPr lang="en-US" sz="1198" kern="0" dirty="0">
+                <a:solidFill>
+                  <a:prstClr val="black"/>
+                </a:solidFill>
+                <a:latin typeface="Verdana" panose="020B0604030504040204" pitchFamily="34" charset="0"/>
+                <a:ea typeface="Verdana" panose="020B0604030504040204" pitchFamily="34" charset="0"/>
+              </a:rPr>
+              <a:t>Child</a:t>
+            </a:r>
+            <a:endParaRPr lang="en-US" sz="899" kern="0" dirty="0">
+              <a:solidFill>
+                <a:prstClr val="black"/>
+              </a:solidFill>
+              <a:latin typeface="Verdana" panose="020B0604030504040204" pitchFamily="34" charset="0"/>
+              <a:ea typeface="Verdana" panose="020B0604030504040204" pitchFamily="34" charset="0"/>
+            </a:endParaRPr>
+          </a:p>
+        </p:txBody>
+      </p:sp>
+      <p:cxnSp>
+        <p:nvCxnSpPr>
+          <p:cNvPr id="14" name="Straight Arrow Connector 13">
+            <a:extLst>
+              <a:ext uri="{FF2B5EF4-FFF2-40B4-BE49-F238E27FC236}">
+                <a16:creationId xmlns:a16="http://schemas.microsoft.com/office/drawing/2014/main" id="{13940FEA-5EEB-988C-92F0-F15505494DBD}"/>
+              </a:ext>
+            </a:extLst>
+          </p:cNvPr>
+          <p:cNvCxnSpPr>
+            <a:cxnSpLocks/>
+            <a:stCxn id="13" idx="3"/>
+            <a:endCxn id="8" idx="1"/>
+          </p:cNvCxnSpPr>
+          <p:nvPr/>
+        </p:nvCxnSpPr>
+        <p:spPr>
+          <a:xfrm>
+            <a:off x="6606702" y="988747"/>
+            <a:ext cx="1042145" cy="0"/>
+          </a:xfrm>
+          <a:prstGeom prst="straightConnector1">
+            <a:avLst/>
+          </a:prstGeom>
+          <a:ln w="19050">
+            <a:solidFill>
+              <a:srgbClr val="B6B6B6"/>
+            </a:solidFill>
+            <a:tailEnd type="triangle"/>
+          </a:ln>
+        </p:spPr>
+        <p:style>
+          <a:lnRef idx="1">
+            <a:schemeClr val="accent1"/>
+          </a:lnRef>
+          <a:fillRef idx="0">
+            <a:schemeClr val="accent1"/>
+          </a:fillRef>
+          <a:effectRef idx="0">
+            <a:schemeClr val="accent1"/>
+          </a:effectRef>
+          <a:fontRef idx="minor">
+            <a:schemeClr val="tx1"/>
+          </a:fontRef>
+        </p:style>
+      </p:cxnSp>
+      <p:sp>
+        <p:nvSpPr>
+          <p:cNvPr id="19" name="Rectangle 18">
+            <a:extLst>
+              <a:ext uri="{FF2B5EF4-FFF2-40B4-BE49-F238E27FC236}">
+                <a16:creationId xmlns:a16="http://schemas.microsoft.com/office/drawing/2014/main" id="{197ED00B-A9C1-A954-7C32-B21CE4033C59}"/>
+              </a:ext>
+            </a:extLst>
+          </p:cNvPr>
+          <p:cNvSpPr/>
+          <p:nvPr/>
+        </p:nvSpPr>
+        <p:spPr>
+          <a:xfrm>
+            <a:off x="6661502" y="662835"/>
+            <a:ext cx="932544" cy="323579"/>
+          </a:xfrm>
+          <a:prstGeom prst="rect">
+            <a:avLst/>
+          </a:prstGeom>
+          <a:noFill/>
+          <a:ln w="12700" cap="flat" cmpd="sng" algn="ctr">
+            <a:noFill/>
+            <a:prstDash val="solid"/>
+            <a:miter lim="800000"/>
+          </a:ln>
+          <a:effectLst/>
+        </p:spPr>
+        <p:txBody>
+          <a:bodyPr rtlCol="0" anchor="ctr"/>
+          <a:lstStyle/>
+          <a:p>
+            <a:pPr algn="ctr" defTabSz="684886">
+              <a:defRPr/>
+            </a:pPr>
+            <a:r>
+              <a:rPr lang="en-US" sz="1198" kern="0" dirty="0">
+                <a:solidFill>
+                  <a:schemeClr val="bg1">
+                    <a:lumMod val="50000"/>
+                  </a:schemeClr>
+                </a:solidFill>
+                <a:latin typeface="Verdana" panose="020B0604030504040204" pitchFamily="34" charset="0"/>
+                <a:ea typeface="Verdana" panose="020B0604030504040204" pitchFamily="34" charset="0"/>
+              </a:rPr>
+              <a:t>patient</a:t>
+            </a:r>
+          </a:p>
+        </p:txBody>
+      </p:sp>
+      <p:sp>
+        <p:nvSpPr>
+          <p:cNvPr id="20" name="Rectangle 19">
+            <a:extLst>
+              <a:ext uri="{FF2B5EF4-FFF2-40B4-BE49-F238E27FC236}">
+                <a16:creationId xmlns:a16="http://schemas.microsoft.com/office/drawing/2014/main" id="{ED8773AD-ED11-394C-9692-35C0932943B1}"/>
+              </a:ext>
+            </a:extLst>
+          </p:cNvPr>
+          <p:cNvSpPr/>
+          <p:nvPr/>
+        </p:nvSpPr>
+        <p:spPr>
+          <a:xfrm>
+            <a:off x="7648847" y="1964272"/>
+            <a:ext cx="2232000" cy="647157"/>
+          </a:xfrm>
+          <a:prstGeom prst="rect">
+            <a:avLst/>
+          </a:prstGeom>
+          <a:noFill/>
+          <a:ln w="19050" cap="flat" cmpd="sng" algn="ctr">
+            <a:solidFill>
+              <a:srgbClr val="F79646"/>
+            </a:solidFill>
+            <a:prstDash val="solid"/>
+            <a:miter lim="800000"/>
+          </a:ln>
+          <a:effectLst/>
+        </p:spPr>
+        <p:txBody>
+          <a:bodyPr rtlCol="0" anchor="ctr"/>
+          <a:lstStyle/>
+          <a:p>
+            <a:pPr algn="ctr" defTabSz="684886">
+              <a:defRPr/>
+            </a:pPr>
+            <a:r>
+              <a:rPr lang="en-US" sz="1198" kern="0" dirty="0">
+                <a:solidFill>
+                  <a:prstClr val="black"/>
+                </a:solidFill>
+                <a:latin typeface="Verdana" panose="020B0604030504040204" pitchFamily="34" charset="0"/>
+                <a:ea typeface="Verdana" panose="020B0604030504040204" pitchFamily="34" charset="0"/>
+              </a:rPr>
+              <a:t>CH EPREG Observation: Fetal Position</a:t>
+            </a:r>
+          </a:p>
+        </p:txBody>
+      </p:sp>
+      <p:sp>
+        <p:nvSpPr>
+          <p:cNvPr id="21" name="Rectangle 20">
+            <a:extLst>
+              <a:ext uri="{FF2B5EF4-FFF2-40B4-BE49-F238E27FC236}">
+                <a16:creationId xmlns:a16="http://schemas.microsoft.com/office/drawing/2014/main" id="{844D1191-7D34-B8F6-4E53-484BAD81CADA}"/>
+              </a:ext>
+            </a:extLst>
+          </p:cNvPr>
+          <p:cNvSpPr/>
+          <p:nvPr/>
+        </p:nvSpPr>
+        <p:spPr>
+          <a:xfrm>
+            <a:off x="7924380" y="1476509"/>
+            <a:ext cx="932544" cy="323579"/>
+          </a:xfrm>
+          <a:prstGeom prst="rect">
+            <a:avLst/>
+          </a:prstGeom>
+          <a:noFill/>
+          <a:ln w="12700" cap="flat" cmpd="sng" algn="ctr">
+            <a:noFill/>
+            <a:prstDash val="solid"/>
+            <a:miter lim="800000"/>
+          </a:ln>
+          <a:effectLst/>
+        </p:spPr>
+        <p:txBody>
+          <a:bodyPr rtlCol="0" anchor="ctr"/>
+          <a:lstStyle/>
+          <a:p>
+            <a:pPr algn="ctr" defTabSz="684886">
+              <a:defRPr/>
+            </a:pPr>
+            <a:r>
+              <a:rPr lang="en-US" sz="1198" kern="0" dirty="0">
+                <a:solidFill>
+                  <a:schemeClr val="bg1">
+                    <a:lumMod val="50000"/>
+                  </a:schemeClr>
+                </a:solidFill>
+                <a:latin typeface="Verdana" panose="020B0604030504040204" pitchFamily="34" charset="0"/>
+                <a:ea typeface="Verdana" panose="020B0604030504040204" pitchFamily="34" charset="0"/>
+              </a:rPr>
+              <a:t>subject</a:t>
+            </a:r>
+          </a:p>
+        </p:txBody>
+      </p:sp>
+      <p:cxnSp>
+        <p:nvCxnSpPr>
+          <p:cNvPr id="23" name="Straight Arrow Connector 22">
+            <a:extLst>
+              <a:ext uri="{FF2B5EF4-FFF2-40B4-BE49-F238E27FC236}">
+                <a16:creationId xmlns:a16="http://schemas.microsoft.com/office/drawing/2014/main" id="{E675C4DD-7542-4877-BB86-FC7F95C98FD2}"/>
+              </a:ext>
+            </a:extLst>
+          </p:cNvPr>
+          <p:cNvCxnSpPr>
+            <a:cxnSpLocks/>
+            <a:stCxn id="28" idx="0"/>
+            <a:endCxn id="12" idx="2"/>
+          </p:cNvCxnSpPr>
+          <p:nvPr/>
+        </p:nvCxnSpPr>
+        <p:spPr>
+          <a:xfrm flipV="1">
+            <a:off x="2216557" y="1312325"/>
+            <a:ext cx="0" cy="651948"/>
+          </a:xfrm>
+          <a:prstGeom prst="straightConnector1">
+            <a:avLst/>
+          </a:prstGeom>
+          <a:ln w="19050">
+            <a:solidFill>
+              <a:srgbClr val="B6B6B6"/>
+            </a:solidFill>
+            <a:tailEnd type="triangle"/>
+          </a:ln>
+        </p:spPr>
+        <p:style>
+          <a:lnRef idx="1">
+            <a:schemeClr val="accent1"/>
+          </a:lnRef>
+          <a:fillRef idx="0">
+            <a:schemeClr val="accent1"/>
+          </a:fillRef>
+          <a:effectRef idx="0">
+            <a:schemeClr val="accent1"/>
+          </a:effectRef>
+          <a:fontRef idx="minor">
+            <a:schemeClr val="tx1"/>
+          </a:fontRef>
+        </p:style>
+      </p:cxnSp>
+      <p:sp>
+        <p:nvSpPr>
+          <p:cNvPr id="24" name="Rectangle 23">
+            <a:extLst>
+              <a:ext uri="{FF2B5EF4-FFF2-40B4-BE49-F238E27FC236}">
+                <a16:creationId xmlns:a16="http://schemas.microsoft.com/office/drawing/2014/main" id="{F630C9E5-220C-79E6-A4C8-6F0C4A54AB9C}"/>
+              </a:ext>
+            </a:extLst>
+          </p:cNvPr>
+          <p:cNvSpPr/>
+          <p:nvPr/>
+        </p:nvSpPr>
+        <p:spPr>
+          <a:xfrm>
+            <a:off x="2141809" y="1476509"/>
+            <a:ext cx="932544" cy="323579"/>
+          </a:xfrm>
+          <a:prstGeom prst="rect">
+            <a:avLst/>
+          </a:prstGeom>
+          <a:noFill/>
+          <a:ln w="12700" cap="flat" cmpd="sng" algn="ctr">
+            <a:noFill/>
+            <a:prstDash val="solid"/>
+            <a:miter lim="800000"/>
+          </a:ln>
+          <a:effectLst/>
+        </p:spPr>
+        <p:txBody>
+          <a:bodyPr rtlCol="0" anchor="ctr"/>
+          <a:lstStyle/>
+          <a:p>
+            <a:pPr algn="ctr" defTabSz="684886">
+              <a:defRPr/>
+            </a:pPr>
+            <a:r>
+              <a:rPr lang="en-US" sz="1198" kern="0" dirty="0">
+                <a:solidFill>
+                  <a:schemeClr val="bg1">
+                    <a:lumMod val="50000"/>
+                  </a:schemeClr>
+                </a:solidFill>
+                <a:latin typeface="Verdana" panose="020B0604030504040204" pitchFamily="34" charset="0"/>
+                <a:ea typeface="Verdana" panose="020B0604030504040204" pitchFamily="34" charset="0"/>
+              </a:rPr>
+              <a:t>subject</a:t>
+            </a:r>
+          </a:p>
+        </p:txBody>
+      </p:sp>
+      <p:cxnSp>
+        <p:nvCxnSpPr>
+          <p:cNvPr id="25" name="Straight Arrow Connector 24">
+            <a:extLst>
+              <a:ext uri="{FF2B5EF4-FFF2-40B4-BE49-F238E27FC236}">
+                <a16:creationId xmlns:a16="http://schemas.microsoft.com/office/drawing/2014/main" id="{F5E120D4-3696-A3DC-A76F-826F894DEE1C}"/>
+              </a:ext>
+            </a:extLst>
+          </p:cNvPr>
+          <p:cNvCxnSpPr>
+            <a:cxnSpLocks/>
+            <a:stCxn id="20" idx="0"/>
+            <a:endCxn id="8" idx="2"/>
+          </p:cNvCxnSpPr>
+          <p:nvPr/>
+        </p:nvCxnSpPr>
+        <p:spPr>
+          <a:xfrm flipV="1">
+            <a:off x="8764847" y="1312325"/>
+            <a:ext cx="0" cy="651947"/>
+          </a:xfrm>
+          <a:prstGeom prst="straightConnector1">
+            <a:avLst/>
+          </a:prstGeom>
+          <a:ln w="19050">
+            <a:solidFill>
+              <a:srgbClr val="B6B6B6"/>
+            </a:solidFill>
+            <a:tailEnd type="triangle"/>
+          </a:ln>
+        </p:spPr>
+        <p:style>
+          <a:lnRef idx="1">
+            <a:schemeClr val="accent1"/>
+          </a:lnRef>
+          <a:fillRef idx="0">
+            <a:schemeClr val="accent1"/>
+          </a:fillRef>
+          <a:effectRef idx="0">
+            <a:schemeClr val="accent1"/>
+          </a:effectRef>
+          <a:fontRef idx="minor">
+            <a:schemeClr val="tx1"/>
+          </a:fontRef>
+        </p:style>
+      </p:cxnSp>
+      <p:sp>
+        <p:nvSpPr>
+          <p:cNvPr id="28" name="Rectangle 27">
+            <a:extLst>
+              <a:ext uri="{FF2B5EF4-FFF2-40B4-BE49-F238E27FC236}">
+                <a16:creationId xmlns:a16="http://schemas.microsoft.com/office/drawing/2014/main" id="{A041B352-8215-BE06-F6DE-CE5E8C750031}"/>
+              </a:ext>
+            </a:extLst>
+          </p:cNvPr>
+          <p:cNvSpPr/>
+          <p:nvPr/>
+        </p:nvSpPr>
+        <p:spPr>
+          <a:xfrm>
+            <a:off x="1100557" y="1964273"/>
+            <a:ext cx="2232000" cy="647157"/>
+          </a:xfrm>
+          <a:prstGeom prst="rect">
+            <a:avLst/>
+          </a:prstGeom>
+          <a:noFill/>
+          <a:ln w="19050" cap="flat" cmpd="sng" algn="ctr">
+            <a:solidFill>
+              <a:srgbClr val="C00000"/>
+            </a:solidFill>
+            <a:prstDash val="solid"/>
+            <a:miter lim="800000"/>
+          </a:ln>
+          <a:effectLst/>
+        </p:spPr>
+        <p:txBody>
+          <a:bodyPr rtlCol="0" anchor="ctr"/>
+          <a:lstStyle/>
+          <a:p>
+            <a:pPr algn="ctr" defTabSz="684886">
+              <a:defRPr/>
+            </a:pPr>
+            <a:r>
+              <a:rPr lang="en-US" sz="1198" kern="0" dirty="0">
+                <a:solidFill>
+                  <a:prstClr val="black"/>
+                </a:solidFill>
+                <a:latin typeface="Verdana" panose="020B0604030504040204" pitchFamily="34" charset="0"/>
+                <a:ea typeface="Verdana" panose="020B0604030504040204" pitchFamily="34" charset="0"/>
+              </a:rPr>
+              <a:t>CH EPREG Observation:</a:t>
+            </a:r>
+            <a:br>
+              <a:rPr lang="en-US" sz="1198" kern="0" dirty="0">
+                <a:solidFill>
+                  <a:prstClr val="black"/>
+                </a:solidFill>
+                <a:latin typeface="Verdana" panose="020B0604030504040204" pitchFamily="34" charset="0"/>
+                <a:ea typeface="Verdana" panose="020B0604030504040204" pitchFamily="34" charset="0"/>
+              </a:rPr>
+            </a:br>
+            <a:r>
+              <a:rPr lang="en-US" sz="1198" kern="0" dirty="0">
+                <a:solidFill>
+                  <a:prstClr val="black"/>
+                </a:solidFill>
+                <a:latin typeface="Verdana" panose="020B0604030504040204" pitchFamily="34" charset="0"/>
+                <a:ea typeface="Verdana" panose="020B0604030504040204" pitchFamily="34" charset="0"/>
+              </a:rPr>
+              <a:t>Gestational Age</a:t>
+            </a:r>
+            <a:endParaRPr lang="en-US" sz="1348" kern="0" dirty="0">
+              <a:solidFill>
+                <a:prstClr val="black"/>
+              </a:solidFill>
+              <a:latin typeface="Verdana" panose="020B0604030504040204" pitchFamily="34" charset="0"/>
+              <a:ea typeface="Verdana" panose="020B0604030504040204" pitchFamily="34" charset="0"/>
+            </a:endParaRPr>
+          </a:p>
+        </p:txBody>
+      </p:sp>
+      <p:sp>
+        <p:nvSpPr>
+          <p:cNvPr id="2" name="Rectangle 1">
+            <a:extLst>
+              <a:ext uri="{FF2B5EF4-FFF2-40B4-BE49-F238E27FC236}">
+                <a16:creationId xmlns:a16="http://schemas.microsoft.com/office/drawing/2014/main" id="{BCED9CF8-204A-7D61-2349-2AA7520E1421}"/>
+              </a:ext>
+            </a:extLst>
+          </p:cNvPr>
+          <p:cNvSpPr/>
+          <p:nvPr/>
+        </p:nvSpPr>
+        <p:spPr>
+          <a:xfrm>
+            <a:off x="1100557" y="3263378"/>
+            <a:ext cx="2232000" cy="647157"/>
+          </a:xfrm>
+          <a:prstGeom prst="rect">
+            <a:avLst/>
+          </a:prstGeom>
+          <a:noFill/>
+          <a:ln w="19050" cap="flat" cmpd="sng" algn="ctr">
+            <a:solidFill>
+              <a:srgbClr val="C00000"/>
+            </a:solidFill>
+            <a:prstDash val="solid"/>
+            <a:miter lim="800000"/>
+          </a:ln>
+          <a:effectLst/>
+        </p:spPr>
+        <p:txBody>
+          <a:bodyPr rtlCol="0" anchor="ctr"/>
+          <a:lstStyle/>
+          <a:p>
+            <a:pPr algn="ctr" defTabSz="684886">
+              <a:defRPr/>
+            </a:pPr>
+            <a:r>
+              <a:rPr lang="en-US" sz="1198" kern="0" dirty="0">
+                <a:solidFill>
+                  <a:prstClr val="black"/>
+                </a:solidFill>
+                <a:latin typeface="Verdana" panose="020B0604030504040204" pitchFamily="34" charset="0"/>
+                <a:ea typeface="Verdana" panose="020B0604030504040204" pitchFamily="34" charset="0"/>
+              </a:rPr>
+              <a:t>CH EPREG Encounter:</a:t>
+            </a:r>
+            <a:br>
+              <a:rPr lang="en-US" sz="1198" kern="0" dirty="0">
+                <a:solidFill>
+                  <a:prstClr val="black"/>
+                </a:solidFill>
+                <a:latin typeface="Verdana" panose="020B0604030504040204" pitchFamily="34" charset="0"/>
+                <a:ea typeface="Verdana" panose="020B0604030504040204" pitchFamily="34" charset="0"/>
+              </a:rPr>
+            </a:br>
+            <a:r>
+              <a:rPr lang="en-US" sz="1198" kern="0" dirty="0">
+                <a:solidFill>
+                  <a:prstClr val="black"/>
+                </a:solidFill>
+                <a:latin typeface="Verdana" panose="020B0604030504040204" pitchFamily="34" charset="0"/>
+                <a:ea typeface="Verdana" panose="020B0604030504040204" pitchFamily="34" charset="0"/>
+              </a:rPr>
+              <a:t>Mother</a:t>
+            </a:r>
+            <a:endParaRPr lang="en-US" sz="1348" kern="0" dirty="0">
+              <a:solidFill>
+                <a:prstClr val="black"/>
+              </a:solidFill>
+              <a:latin typeface="Verdana" panose="020B0604030504040204" pitchFamily="34" charset="0"/>
+              <a:ea typeface="Verdana" panose="020B0604030504040204" pitchFamily="34" charset="0"/>
+            </a:endParaRPr>
+          </a:p>
+        </p:txBody>
+      </p:sp>
+      <p:cxnSp>
+        <p:nvCxnSpPr>
+          <p:cNvPr id="3" name="Straight Arrow Connector 2">
+            <a:extLst>
+              <a:ext uri="{FF2B5EF4-FFF2-40B4-BE49-F238E27FC236}">
+                <a16:creationId xmlns:a16="http://schemas.microsoft.com/office/drawing/2014/main" id="{59F28148-33DD-42B4-04EC-446A07FE9A23}"/>
+              </a:ext>
+            </a:extLst>
+          </p:cNvPr>
+          <p:cNvCxnSpPr>
+            <a:cxnSpLocks/>
+            <a:stCxn id="28" idx="2"/>
+            <a:endCxn id="2" idx="0"/>
+          </p:cNvCxnSpPr>
+          <p:nvPr/>
+        </p:nvCxnSpPr>
+        <p:spPr>
+          <a:xfrm>
+            <a:off x="2216557" y="2611430"/>
+            <a:ext cx="0" cy="651948"/>
+          </a:xfrm>
+          <a:prstGeom prst="straightConnector1">
+            <a:avLst/>
+          </a:prstGeom>
+          <a:ln w="19050">
+            <a:solidFill>
+              <a:srgbClr val="B6B6B6"/>
+            </a:solidFill>
+            <a:tailEnd type="triangle"/>
+          </a:ln>
+        </p:spPr>
+        <p:style>
+          <a:lnRef idx="1">
+            <a:schemeClr val="accent1"/>
+          </a:lnRef>
+          <a:fillRef idx="0">
+            <a:schemeClr val="accent1"/>
+          </a:fillRef>
+          <a:effectRef idx="0">
+            <a:schemeClr val="accent1"/>
+          </a:effectRef>
+          <a:fontRef idx="minor">
+            <a:schemeClr val="tx1"/>
+          </a:fontRef>
+        </p:style>
+      </p:cxnSp>
+      <p:sp>
+        <p:nvSpPr>
+          <p:cNvPr id="6" name="Rectangle 5">
+            <a:extLst>
+              <a:ext uri="{FF2B5EF4-FFF2-40B4-BE49-F238E27FC236}">
+                <a16:creationId xmlns:a16="http://schemas.microsoft.com/office/drawing/2014/main" id="{8B1B818D-A2EB-491D-61A1-C7D494942D6C}"/>
+              </a:ext>
+            </a:extLst>
+          </p:cNvPr>
+          <p:cNvSpPr/>
+          <p:nvPr/>
+        </p:nvSpPr>
+        <p:spPr>
+          <a:xfrm>
+            <a:off x="2216556" y="2775614"/>
+            <a:ext cx="955949" cy="323579"/>
+          </a:xfrm>
+          <a:prstGeom prst="rect">
+            <a:avLst/>
+          </a:prstGeom>
+          <a:noFill/>
+          <a:ln w="12700" cap="flat" cmpd="sng" algn="ctr">
+            <a:noFill/>
+            <a:prstDash val="solid"/>
+            <a:miter lim="800000"/>
+          </a:ln>
+          <a:effectLst/>
+        </p:spPr>
+        <p:txBody>
+          <a:bodyPr rtlCol="0" anchor="ctr"/>
+          <a:lstStyle/>
+          <a:p>
+            <a:pPr algn="ctr" defTabSz="684886">
+              <a:defRPr/>
+            </a:pPr>
+            <a:r>
+              <a:rPr lang="en-US" sz="1198" kern="0" dirty="0">
+                <a:solidFill>
+                  <a:schemeClr val="bg1">
+                    <a:lumMod val="50000"/>
+                  </a:schemeClr>
+                </a:solidFill>
+                <a:latin typeface="Verdana" panose="020B0604030504040204" pitchFamily="34" charset="0"/>
+                <a:ea typeface="Verdana" panose="020B0604030504040204" pitchFamily="34" charset="0"/>
+              </a:rPr>
+              <a:t>encounter</a:t>
+            </a:r>
+          </a:p>
+        </p:txBody>
+      </p:sp>
+      <p:cxnSp>
+        <p:nvCxnSpPr>
+          <p:cNvPr id="15" name="Connector: Elbow 14">
+            <a:extLst>
+              <a:ext uri="{FF2B5EF4-FFF2-40B4-BE49-F238E27FC236}">
+                <a16:creationId xmlns:a16="http://schemas.microsoft.com/office/drawing/2014/main" id="{D72624A2-8577-5E6E-76D8-D76A7C1AA6B0}"/>
+              </a:ext>
+            </a:extLst>
+          </p:cNvPr>
+          <p:cNvCxnSpPr>
+            <a:cxnSpLocks/>
+            <a:stCxn id="2" idx="1"/>
+            <a:endCxn id="12" idx="1"/>
+          </p:cNvCxnSpPr>
+          <p:nvPr/>
+        </p:nvCxnSpPr>
+        <p:spPr>
+          <a:xfrm rot="10800000">
+            <a:off x="1100557" y="988747"/>
+            <a:ext cx="12700" cy="2598210"/>
+          </a:xfrm>
+          <a:prstGeom prst="bentConnector3">
+            <a:avLst>
+              <a:gd name="adj1" fmla="val 1800000"/>
+            </a:avLst>
+          </a:prstGeom>
+          <a:ln w="19050">
+            <a:solidFill>
+              <a:srgbClr val="B6B6B6"/>
+            </a:solidFill>
+            <a:tailEnd type="triangle"/>
+          </a:ln>
+        </p:spPr>
+        <p:style>
+          <a:lnRef idx="1">
+            <a:schemeClr val="accent1"/>
+          </a:lnRef>
+          <a:fillRef idx="0">
+            <a:schemeClr val="accent1"/>
+          </a:fillRef>
+          <a:effectRef idx="0">
+            <a:schemeClr val="accent1"/>
+          </a:effectRef>
+          <a:fontRef idx="minor">
+            <a:schemeClr val="tx1"/>
+          </a:fontRef>
+        </p:style>
+      </p:cxnSp>
+      <p:sp>
+        <p:nvSpPr>
+          <p:cNvPr id="22" name="Rectangle 21">
+            <a:extLst>
+              <a:ext uri="{FF2B5EF4-FFF2-40B4-BE49-F238E27FC236}">
+                <a16:creationId xmlns:a16="http://schemas.microsoft.com/office/drawing/2014/main" id="{780C448F-AB0D-E26D-A035-1D6FA6687A48}"/>
+              </a:ext>
+            </a:extLst>
+          </p:cNvPr>
+          <p:cNvSpPr/>
+          <p:nvPr/>
+        </p:nvSpPr>
+        <p:spPr>
+          <a:xfrm>
+            <a:off x="72005" y="2122600"/>
+            <a:ext cx="932544" cy="323579"/>
+          </a:xfrm>
+          <a:prstGeom prst="rect">
+            <a:avLst/>
+          </a:prstGeom>
+          <a:noFill/>
+          <a:ln w="12700" cap="flat" cmpd="sng" algn="ctr">
+            <a:noFill/>
+            <a:prstDash val="solid"/>
+            <a:miter lim="800000"/>
+          </a:ln>
+          <a:effectLst/>
+        </p:spPr>
+        <p:txBody>
+          <a:bodyPr rtlCol="0" anchor="ctr"/>
+          <a:lstStyle/>
+          <a:p>
+            <a:pPr algn="ctr" defTabSz="684886">
+              <a:defRPr/>
+            </a:pPr>
+            <a:r>
+              <a:rPr lang="en-US" sz="1198" kern="0" dirty="0">
+                <a:solidFill>
+                  <a:schemeClr val="bg1">
+                    <a:lumMod val="50000"/>
+                  </a:schemeClr>
+                </a:solidFill>
+                <a:latin typeface="Verdana" panose="020B0604030504040204" pitchFamily="34" charset="0"/>
+                <a:ea typeface="Verdana" panose="020B0604030504040204" pitchFamily="34" charset="0"/>
+              </a:rPr>
+              <a:t>subject</a:t>
+            </a:r>
+          </a:p>
+        </p:txBody>
+      </p:sp>
+      <p:sp>
+        <p:nvSpPr>
+          <p:cNvPr id="29" name="Rectangle 28">
+            <a:extLst>
+              <a:ext uri="{FF2B5EF4-FFF2-40B4-BE49-F238E27FC236}">
+                <a16:creationId xmlns:a16="http://schemas.microsoft.com/office/drawing/2014/main" id="{95065E52-59A6-9126-843D-57EF758BBD17}"/>
+              </a:ext>
+            </a:extLst>
+          </p:cNvPr>
+          <p:cNvSpPr/>
+          <p:nvPr/>
+        </p:nvSpPr>
+        <p:spPr>
+          <a:xfrm>
+            <a:off x="7648847" y="3262542"/>
+            <a:ext cx="2232000" cy="647157"/>
+          </a:xfrm>
+          <a:prstGeom prst="rect">
+            <a:avLst/>
+          </a:prstGeom>
+          <a:noFill/>
+          <a:ln w="19050" cap="flat" cmpd="sng" algn="ctr">
+            <a:solidFill>
+              <a:srgbClr val="F79646"/>
+            </a:solidFill>
+            <a:prstDash val="solid"/>
+            <a:miter lim="800000"/>
+          </a:ln>
+          <a:effectLst/>
+        </p:spPr>
+        <p:txBody>
+          <a:bodyPr rtlCol="0" anchor="ctr"/>
+          <a:lstStyle/>
+          <a:p>
+            <a:pPr algn="ctr" defTabSz="684886">
+              <a:defRPr/>
+            </a:pPr>
+            <a:r>
+              <a:rPr lang="en-US" sz="1198" kern="0" dirty="0">
+                <a:solidFill>
+                  <a:prstClr val="black"/>
+                </a:solidFill>
+                <a:latin typeface="Verdana" panose="020B0604030504040204" pitchFamily="34" charset="0"/>
+                <a:ea typeface="Verdana" panose="020B0604030504040204" pitchFamily="34" charset="0"/>
+              </a:rPr>
+              <a:t>CH EPREG Encounter: Child</a:t>
+            </a:r>
+          </a:p>
+        </p:txBody>
+      </p:sp>
+      <p:cxnSp>
+        <p:nvCxnSpPr>
+          <p:cNvPr id="32" name="Straight Arrow Connector 31">
+            <a:extLst>
+              <a:ext uri="{FF2B5EF4-FFF2-40B4-BE49-F238E27FC236}">
+                <a16:creationId xmlns:a16="http://schemas.microsoft.com/office/drawing/2014/main" id="{0A5AA4ED-8D25-56FB-6A01-5039AF8CE529}"/>
+              </a:ext>
+            </a:extLst>
+          </p:cNvPr>
+          <p:cNvCxnSpPr>
+            <a:cxnSpLocks/>
+          </p:cNvCxnSpPr>
+          <p:nvPr/>
+        </p:nvCxnSpPr>
+        <p:spPr>
+          <a:xfrm>
+            <a:off x="8764848" y="2611430"/>
+            <a:ext cx="0" cy="651948"/>
+          </a:xfrm>
+          <a:prstGeom prst="straightConnector1">
+            <a:avLst/>
+          </a:prstGeom>
+          <a:ln w="19050">
+            <a:solidFill>
+              <a:srgbClr val="B6B6B6"/>
+            </a:solidFill>
+            <a:tailEnd type="triangle"/>
+          </a:ln>
+        </p:spPr>
+        <p:style>
+          <a:lnRef idx="1">
+            <a:schemeClr val="accent1"/>
+          </a:lnRef>
+          <a:fillRef idx="0">
+            <a:schemeClr val="accent1"/>
+          </a:fillRef>
+          <a:effectRef idx="0">
+            <a:schemeClr val="accent1"/>
+          </a:effectRef>
+          <a:fontRef idx="minor">
+            <a:schemeClr val="tx1"/>
+          </a:fontRef>
+        </p:style>
+      </p:cxnSp>
+      <p:sp>
+        <p:nvSpPr>
+          <p:cNvPr id="34" name="Rectangle 33">
+            <a:extLst>
+              <a:ext uri="{FF2B5EF4-FFF2-40B4-BE49-F238E27FC236}">
+                <a16:creationId xmlns:a16="http://schemas.microsoft.com/office/drawing/2014/main" id="{73D5D007-3133-97B4-94EE-225835F692E7}"/>
+              </a:ext>
+            </a:extLst>
+          </p:cNvPr>
+          <p:cNvSpPr/>
+          <p:nvPr/>
+        </p:nvSpPr>
+        <p:spPr>
+          <a:xfrm>
+            <a:off x="8764847" y="2775614"/>
+            <a:ext cx="955949" cy="323579"/>
+          </a:xfrm>
+          <a:prstGeom prst="rect">
+            <a:avLst/>
+          </a:prstGeom>
+          <a:noFill/>
+          <a:ln w="12700" cap="flat" cmpd="sng" algn="ctr">
+            <a:noFill/>
+            <a:prstDash val="solid"/>
+            <a:miter lim="800000"/>
+          </a:ln>
+          <a:effectLst/>
+        </p:spPr>
+        <p:txBody>
+          <a:bodyPr rtlCol="0" anchor="ctr"/>
+          <a:lstStyle/>
+          <a:p>
+            <a:pPr algn="ctr" defTabSz="684886">
+              <a:defRPr/>
+            </a:pPr>
+            <a:r>
+              <a:rPr lang="en-US" sz="1198" kern="0" dirty="0">
+                <a:solidFill>
+                  <a:schemeClr val="bg1">
+                    <a:lumMod val="50000"/>
+                  </a:schemeClr>
+                </a:solidFill>
+                <a:latin typeface="Verdana" panose="020B0604030504040204" pitchFamily="34" charset="0"/>
+                <a:ea typeface="Verdana" panose="020B0604030504040204" pitchFamily="34" charset="0"/>
+              </a:rPr>
+              <a:t>encounter</a:t>
+            </a:r>
+          </a:p>
+        </p:txBody>
+      </p:sp>
+      <p:cxnSp>
+        <p:nvCxnSpPr>
+          <p:cNvPr id="35" name="Connector: Elbow 34">
+            <a:extLst>
+              <a:ext uri="{FF2B5EF4-FFF2-40B4-BE49-F238E27FC236}">
+                <a16:creationId xmlns:a16="http://schemas.microsoft.com/office/drawing/2014/main" id="{C5E4E5AB-B5E8-447B-AB11-C5E2E2CEA4ED}"/>
+              </a:ext>
+            </a:extLst>
+          </p:cNvPr>
+          <p:cNvCxnSpPr>
+            <a:cxnSpLocks/>
+            <a:stCxn id="29" idx="3"/>
+            <a:endCxn id="8" idx="3"/>
+          </p:cNvCxnSpPr>
+          <p:nvPr/>
+        </p:nvCxnSpPr>
+        <p:spPr>
+          <a:xfrm flipV="1">
+            <a:off x="9880847" y="988747"/>
+            <a:ext cx="12700" cy="2597374"/>
+          </a:xfrm>
+          <a:prstGeom prst="bentConnector3">
+            <a:avLst>
+              <a:gd name="adj1" fmla="val 1800000"/>
+            </a:avLst>
+          </a:prstGeom>
+          <a:ln w="19050">
+            <a:solidFill>
+              <a:srgbClr val="B6B6B6"/>
+            </a:solidFill>
+            <a:tailEnd type="triangle"/>
+          </a:ln>
+        </p:spPr>
+        <p:style>
+          <a:lnRef idx="1">
+            <a:schemeClr val="accent1"/>
+          </a:lnRef>
+          <a:fillRef idx="0">
+            <a:schemeClr val="accent1"/>
+          </a:fillRef>
+          <a:effectRef idx="0">
+            <a:schemeClr val="accent1"/>
+          </a:effectRef>
+          <a:fontRef idx="minor">
+            <a:schemeClr val="tx1"/>
+          </a:fontRef>
+        </p:style>
+      </p:cxnSp>
+      <p:sp>
+        <p:nvSpPr>
+          <p:cNvPr id="38" name="Rectangle 37">
+            <a:extLst>
+              <a:ext uri="{FF2B5EF4-FFF2-40B4-BE49-F238E27FC236}">
+                <a16:creationId xmlns:a16="http://schemas.microsoft.com/office/drawing/2014/main" id="{F9E353C5-AAF8-256B-8C96-1A33DDB52FE1}"/>
+              </a:ext>
+            </a:extLst>
+          </p:cNvPr>
+          <p:cNvSpPr/>
+          <p:nvPr/>
+        </p:nvSpPr>
+        <p:spPr>
+          <a:xfrm>
+            <a:off x="10053598" y="2122600"/>
+            <a:ext cx="932544" cy="323579"/>
+          </a:xfrm>
+          <a:prstGeom prst="rect">
+            <a:avLst/>
+          </a:prstGeom>
+          <a:noFill/>
+          <a:ln w="12700" cap="flat" cmpd="sng" algn="ctr">
+            <a:noFill/>
+            <a:prstDash val="solid"/>
+            <a:miter lim="800000"/>
+          </a:ln>
+          <a:effectLst/>
+        </p:spPr>
+        <p:txBody>
+          <a:bodyPr rtlCol="0" anchor="ctr"/>
+          <a:lstStyle/>
+          <a:p>
+            <a:pPr algn="ctr" defTabSz="684886">
+              <a:defRPr/>
+            </a:pPr>
+            <a:r>
+              <a:rPr lang="en-US" sz="1198" kern="0" dirty="0">
+                <a:solidFill>
+                  <a:schemeClr val="bg1">
+                    <a:lumMod val="50000"/>
+                  </a:schemeClr>
+                </a:solidFill>
+                <a:latin typeface="Verdana" panose="020B0604030504040204" pitchFamily="34" charset="0"/>
+                <a:ea typeface="Verdana" panose="020B0604030504040204" pitchFamily="34" charset="0"/>
+              </a:rPr>
+              <a:t>subject</a:t>
+            </a:r>
+          </a:p>
+        </p:txBody>
+      </p:sp>
+      <p:cxnSp>
+        <p:nvCxnSpPr>
+          <p:cNvPr id="42" name="Straight Arrow Connector 41">
+            <a:extLst>
+              <a:ext uri="{FF2B5EF4-FFF2-40B4-BE49-F238E27FC236}">
+                <a16:creationId xmlns:a16="http://schemas.microsoft.com/office/drawing/2014/main" id="{CF34AC85-6B5F-39AC-1461-7B7BAF3671F2}"/>
+              </a:ext>
+            </a:extLst>
+          </p:cNvPr>
+          <p:cNvCxnSpPr>
+            <a:cxnSpLocks/>
+            <a:stCxn id="29" idx="1"/>
+            <a:endCxn id="2" idx="3"/>
+          </p:cNvCxnSpPr>
+          <p:nvPr/>
+        </p:nvCxnSpPr>
+        <p:spPr>
+          <a:xfrm flipH="1">
+            <a:off x="3332557" y="3586121"/>
+            <a:ext cx="4316290" cy="836"/>
+          </a:xfrm>
+          <a:prstGeom prst="straightConnector1">
+            <a:avLst/>
+          </a:prstGeom>
+          <a:ln w="19050">
+            <a:solidFill>
+              <a:srgbClr val="B6B6B6"/>
+            </a:solidFill>
+            <a:tailEnd type="triangle"/>
+          </a:ln>
+        </p:spPr>
+        <p:style>
+          <a:lnRef idx="1">
+            <a:schemeClr val="accent1"/>
+          </a:lnRef>
+          <a:fillRef idx="0">
+            <a:schemeClr val="accent1"/>
+          </a:fillRef>
+          <a:effectRef idx="0">
+            <a:schemeClr val="accent1"/>
+          </a:effectRef>
+          <a:fontRef idx="minor">
+            <a:schemeClr val="tx1"/>
+          </a:fontRef>
+        </p:style>
+      </p:cxnSp>
+      <p:sp>
+        <p:nvSpPr>
+          <p:cNvPr id="45" name="Rectangle 44">
+            <a:extLst>
+              <a:ext uri="{FF2B5EF4-FFF2-40B4-BE49-F238E27FC236}">
+                <a16:creationId xmlns:a16="http://schemas.microsoft.com/office/drawing/2014/main" id="{7D47CAD4-A56D-4546-43B6-A0721477516D}"/>
+              </a:ext>
+            </a:extLst>
+          </p:cNvPr>
+          <p:cNvSpPr/>
+          <p:nvPr/>
+        </p:nvSpPr>
+        <p:spPr>
+          <a:xfrm>
+            <a:off x="5161804" y="3262541"/>
+            <a:ext cx="932544" cy="323579"/>
+          </a:xfrm>
+          <a:prstGeom prst="rect">
+            <a:avLst/>
+          </a:prstGeom>
+          <a:noFill/>
+          <a:ln w="12700" cap="flat" cmpd="sng" algn="ctr">
+            <a:noFill/>
+            <a:prstDash val="solid"/>
+            <a:miter lim="800000"/>
+          </a:ln>
+          <a:effectLst/>
+        </p:spPr>
+        <p:txBody>
+          <a:bodyPr rtlCol="0" anchor="ctr"/>
+          <a:lstStyle/>
+          <a:p>
+            <a:pPr algn="ctr" defTabSz="684886">
+              <a:defRPr/>
+            </a:pPr>
+            <a:r>
+              <a:rPr lang="en-US" sz="1198" kern="0" dirty="0">
+                <a:solidFill>
+                  <a:schemeClr val="bg1">
+                    <a:lumMod val="50000"/>
+                  </a:schemeClr>
+                </a:solidFill>
+                <a:latin typeface="Verdana" panose="020B0604030504040204" pitchFamily="34" charset="0"/>
+                <a:ea typeface="Verdana" panose="020B0604030504040204" pitchFamily="34" charset="0"/>
+              </a:rPr>
+              <a:t>partOf</a:t>
+            </a:r>
+          </a:p>
+        </p:txBody>
+      </p:sp>
+    </p:spTree>
+    <p:extLst>
+      <p:ext uri="{BB962C8B-B14F-4D97-AF65-F5344CB8AC3E}">
+        <p14:creationId xmlns:p14="http://schemas.microsoft.com/office/powerpoint/2010/main" val="2571965140"/>
       </p:ext>
     </p:extLst>
   </p:cSld>

</xml_diff>